<commit_message>
Small updates to vanilla vqa blog post
</commit_message>
<xml_diff>
--- a/assets/images/vanilla-vqa-question-only.pptx
+++ b/assets/images/vanilla-vqa-question-only.pptx
@@ -2,12 +2,12 @@
 <file path=ppt/presentation.xml><?xml version="1.0" encoding="utf-8"?>
 <p:presentation xmlns:a="http://schemas.openxmlformats.org/drawingml/2006/main" xmlns:r="http://schemas.openxmlformats.org/officeDocument/2006/relationships" xmlns:p="http://schemas.openxmlformats.org/presentationml/2006/main" saveSubsetFonts="1" autoCompressPictures="0">
   <p:sldMasterIdLst>
-    <p:sldMasterId id="2147483768" r:id="rId1"/>
+    <p:sldMasterId id="2147483792" r:id="rId1"/>
   </p:sldMasterIdLst>
   <p:sldIdLst>
     <p:sldId id="256" r:id="rId2"/>
   </p:sldIdLst>
-  <p:sldSz cx="6721475" cy="1508125"/>
+  <p:sldSz cx="6721475" cy="1782763"/>
   <p:notesSz cx="6858000" cy="9144000"/>
   <p:defaultTextStyle>
     <a:defPPr>
@@ -141,15 +141,15 @@
         </p:nvSpPr>
         <p:spPr>
           <a:xfrm>
-            <a:off x="840185" y="246816"/>
-            <a:ext cx="5041106" cy="525051"/>
+            <a:off x="840185" y="291762"/>
+            <a:ext cx="5041106" cy="620666"/>
           </a:xfrm>
         </p:spPr>
         <p:txBody>
           <a:bodyPr anchor="b"/>
           <a:lstStyle>
             <a:lvl1pPr algn="ctr">
-              <a:defRPr sz="1319"/>
+              <a:defRPr sz="1560"/>
             </a:lvl1pPr>
           </a:lstStyle>
           <a:p>
@@ -173,8 +173,8 @@
         </p:nvSpPr>
         <p:spPr>
           <a:xfrm>
-            <a:off x="840185" y="792115"/>
-            <a:ext cx="5041106" cy="364114"/>
+            <a:off x="840185" y="936363"/>
+            <a:ext cx="5041106" cy="430422"/>
           </a:xfrm>
         </p:spPr>
         <p:txBody>
@@ -182,39 +182,39 @@
           <a:lstStyle>
             <a:lvl1pPr marL="0" indent="0" algn="ctr">
               <a:buNone/>
-              <a:defRPr sz="528"/>
+              <a:defRPr sz="624"/>
             </a:lvl1pPr>
-            <a:lvl2pPr marL="100538" indent="0" algn="ctr">
-              <a:buNone/>
-              <a:defRPr sz="440"/>
+            <a:lvl2pPr marL="118872" indent="0" algn="ctr">
+              <a:buNone/>
+              <a:defRPr sz="520"/>
             </a:lvl2pPr>
-            <a:lvl3pPr marL="201077" indent="0" algn="ctr">
-              <a:buNone/>
-              <a:defRPr sz="396"/>
+            <a:lvl3pPr marL="237744" indent="0" algn="ctr">
+              <a:buNone/>
+              <a:defRPr sz="468"/>
             </a:lvl3pPr>
-            <a:lvl4pPr marL="301615" indent="0" algn="ctr">
-              <a:buNone/>
-              <a:defRPr sz="352"/>
+            <a:lvl4pPr marL="356616" indent="0" algn="ctr">
+              <a:buNone/>
+              <a:defRPr sz="416"/>
             </a:lvl4pPr>
-            <a:lvl5pPr marL="402153" indent="0" algn="ctr">
-              <a:buNone/>
-              <a:defRPr sz="352"/>
+            <a:lvl5pPr marL="475488" indent="0" algn="ctr">
+              <a:buNone/>
+              <a:defRPr sz="416"/>
             </a:lvl5pPr>
-            <a:lvl6pPr marL="502691" indent="0" algn="ctr">
-              <a:buNone/>
-              <a:defRPr sz="352"/>
+            <a:lvl6pPr marL="594360" indent="0" algn="ctr">
+              <a:buNone/>
+              <a:defRPr sz="416"/>
             </a:lvl6pPr>
-            <a:lvl7pPr marL="603230" indent="0" algn="ctr">
-              <a:buNone/>
-              <a:defRPr sz="352"/>
+            <a:lvl7pPr marL="713232" indent="0" algn="ctr">
+              <a:buNone/>
+              <a:defRPr sz="416"/>
             </a:lvl7pPr>
-            <a:lvl8pPr marL="703768" indent="0" algn="ctr">
-              <a:buNone/>
-              <a:defRPr sz="352"/>
+            <a:lvl8pPr marL="832104" indent="0" algn="ctr">
+              <a:buNone/>
+              <a:defRPr sz="416"/>
             </a:lvl8pPr>
-            <a:lvl9pPr marL="804306" indent="0" algn="ctr">
-              <a:buNone/>
-              <a:defRPr sz="352"/>
+            <a:lvl9pPr marL="950976" indent="0" algn="ctr">
+              <a:buNone/>
+              <a:defRPr sz="416"/>
             </a:lvl9pPr>
           </a:lstStyle>
           <a:p>
@@ -243,7 +243,7 @@
           <a:p>
             <a:fld id="{CB11009B-BBC6-BD47-8F7A-6903AD4ACCCD}" type="datetimeFigureOut">
               <a:rPr lang="en-US" smtClean="0"/>
-              <a:t>6/4/19</a:t>
+              <a:t>6/9/19</a:t>
             </a:fld>
             <a:endParaRPr lang="en-US"/>
           </a:p>
@@ -294,7 +294,7 @@
     </p:spTree>
     <p:extLst>
       <p:ext uri="{BB962C8B-B14F-4D97-AF65-F5344CB8AC3E}">
-        <p14:creationId xmlns:p14="http://schemas.microsoft.com/office/powerpoint/2010/main" val="2161664301"/>
+        <p14:creationId xmlns:p14="http://schemas.microsoft.com/office/powerpoint/2010/main" val="1450981320"/>
       </p:ext>
     </p:extLst>
   </p:cSld>
@@ -413,7 +413,7 @@
           <a:p>
             <a:fld id="{CB11009B-BBC6-BD47-8F7A-6903AD4ACCCD}" type="datetimeFigureOut">
               <a:rPr lang="en-US" smtClean="0"/>
-              <a:t>6/4/19</a:t>
+              <a:t>6/9/19</a:t>
             </a:fld>
             <a:endParaRPr lang="en-US"/>
           </a:p>
@@ -464,7 +464,7 @@
     </p:spTree>
     <p:extLst>
       <p:ext uri="{BB962C8B-B14F-4D97-AF65-F5344CB8AC3E}">
-        <p14:creationId xmlns:p14="http://schemas.microsoft.com/office/powerpoint/2010/main" val="2584157495"/>
+        <p14:creationId xmlns:p14="http://schemas.microsoft.com/office/powerpoint/2010/main" val="2716282407"/>
       </p:ext>
     </p:extLst>
   </p:cSld>
@@ -503,8 +503,8 @@
         </p:nvSpPr>
         <p:spPr>
           <a:xfrm>
-            <a:off x="4810056" y="80294"/>
-            <a:ext cx="1449318" cy="1278066"/>
+            <a:off x="4810056" y="94916"/>
+            <a:ext cx="1449318" cy="1510809"/>
           </a:xfrm>
         </p:spPr>
         <p:txBody>
@@ -531,8 +531,8 @@
         </p:nvSpPr>
         <p:spPr>
           <a:xfrm>
-            <a:off x="462101" y="80294"/>
-            <a:ext cx="4263936" cy="1278066"/>
+            <a:off x="462101" y="94916"/>
+            <a:ext cx="4263936" cy="1510809"/>
           </a:xfrm>
         </p:spPr>
         <p:txBody>
@@ -593,7 +593,7 @@
           <a:p>
             <a:fld id="{CB11009B-BBC6-BD47-8F7A-6903AD4ACCCD}" type="datetimeFigureOut">
               <a:rPr lang="en-US" smtClean="0"/>
-              <a:t>6/4/19</a:t>
+              <a:t>6/9/19</a:t>
             </a:fld>
             <a:endParaRPr lang="en-US"/>
           </a:p>
@@ -644,7 +644,7 @@
     </p:spTree>
     <p:extLst>
       <p:ext uri="{BB962C8B-B14F-4D97-AF65-F5344CB8AC3E}">
-        <p14:creationId xmlns:p14="http://schemas.microsoft.com/office/powerpoint/2010/main" val="3524727814"/>
+        <p14:creationId xmlns:p14="http://schemas.microsoft.com/office/powerpoint/2010/main" val="3450898231"/>
       </p:ext>
     </p:extLst>
   </p:cSld>
@@ -763,7 +763,7 @@
           <a:p>
             <a:fld id="{CB11009B-BBC6-BD47-8F7A-6903AD4ACCCD}" type="datetimeFigureOut">
               <a:rPr lang="en-US" smtClean="0"/>
-              <a:t>6/4/19</a:t>
+              <a:t>6/9/19</a:t>
             </a:fld>
             <a:endParaRPr lang="en-US"/>
           </a:p>
@@ -814,7 +814,7 @@
     </p:spTree>
     <p:extLst>
       <p:ext uri="{BB962C8B-B14F-4D97-AF65-F5344CB8AC3E}">
-        <p14:creationId xmlns:p14="http://schemas.microsoft.com/office/powerpoint/2010/main" val="2410414624"/>
+        <p14:creationId xmlns:p14="http://schemas.microsoft.com/office/powerpoint/2010/main" val="2011280768"/>
       </p:ext>
     </p:extLst>
   </p:cSld>
@@ -853,15 +853,15 @@
         </p:nvSpPr>
         <p:spPr>
           <a:xfrm>
-            <a:off x="458601" y="375984"/>
-            <a:ext cx="5797272" cy="627338"/>
+            <a:off x="458601" y="444453"/>
+            <a:ext cx="5797272" cy="741580"/>
           </a:xfrm>
         </p:spPr>
         <p:txBody>
           <a:bodyPr anchor="b"/>
           <a:lstStyle>
             <a:lvl1pPr>
-              <a:defRPr sz="1319"/>
+              <a:defRPr sz="1560"/>
             </a:lvl1pPr>
           </a:lstStyle>
           <a:p>
@@ -885,8 +885,8 @@
         </p:nvSpPr>
         <p:spPr>
           <a:xfrm>
-            <a:off x="458601" y="1009257"/>
-            <a:ext cx="5797272" cy="329902"/>
+            <a:off x="458601" y="1193049"/>
+            <a:ext cx="5797272" cy="389979"/>
           </a:xfrm>
         </p:spPr>
         <p:txBody>
@@ -894,7 +894,7 @@
           <a:lstStyle>
             <a:lvl1pPr marL="0" indent="0">
               <a:buNone/>
-              <a:defRPr sz="528">
+              <a:defRPr sz="624">
                 <a:solidFill>
                   <a:schemeClr val="tx1">
                     <a:tint val="75000"/>
@@ -902,9 +902,9 @@
                 </a:solidFill>
               </a:defRPr>
             </a:lvl1pPr>
-            <a:lvl2pPr marL="100538" indent="0">
-              <a:buNone/>
-              <a:defRPr sz="440">
+            <a:lvl2pPr marL="118872" indent="0">
+              <a:buNone/>
+              <a:defRPr sz="520">
                 <a:solidFill>
                   <a:schemeClr val="tx1">
                     <a:tint val="75000"/>
@@ -912,9 +912,9 @@
                 </a:solidFill>
               </a:defRPr>
             </a:lvl2pPr>
-            <a:lvl3pPr marL="201077" indent="0">
-              <a:buNone/>
-              <a:defRPr sz="396">
+            <a:lvl3pPr marL="237744" indent="0">
+              <a:buNone/>
+              <a:defRPr sz="468">
                 <a:solidFill>
                   <a:schemeClr val="tx1">
                     <a:tint val="75000"/>
@@ -922,9 +922,9 @@
                 </a:solidFill>
               </a:defRPr>
             </a:lvl3pPr>
-            <a:lvl4pPr marL="301615" indent="0">
-              <a:buNone/>
-              <a:defRPr sz="352">
+            <a:lvl4pPr marL="356616" indent="0">
+              <a:buNone/>
+              <a:defRPr sz="416">
                 <a:solidFill>
                   <a:schemeClr val="tx1">
                     <a:tint val="75000"/>
@@ -932,9 +932,9 @@
                 </a:solidFill>
               </a:defRPr>
             </a:lvl4pPr>
-            <a:lvl5pPr marL="402153" indent="0">
-              <a:buNone/>
-              <a:defRPr sz="352">
+            <a:lvl5pPr marL="475488" indent="0">
+              <a:buNone/>
+              <a:defRPr sz="416">
                 <a:solidFill>
                   <a:schemeClr val="tx1">
                     <a:tint val="75000"/>
@@ -942,9 +942,9 @@
                 </a:solidFill>
               </a:defRPr>
             </a:lvl5pPr>
-            <a:lvl6pPr marL="502691" indent="0">
-              <a:buNone/>
-              <a:defRPr sz="352">
+            <a:lvl6pPr marL="594360" indent="0">
+              <a:buNone/>
+              <a:defRPr sz="416">
                 <a:solidFill>
                   <a:schemeClr val="tx1">
                     <a:tint val="75000"/>
@@ -952,9 +952,9 @@
                 </a:solidFill>
               </a:defRPr>
             </a:lvl6pPr>
-            <a:lvl7pPr marL="603230" indent="0">
-              <a:buNone/>
-              <a:defRPr sz="352">
+            <a:lvl7pPr marL="713232" indent="0">
+              <a:buNone/>
+              <a:defRPr sz="416">
                 <a:solidFill>
                   <a:schemeClr val="tx1">
                     <a:tint val="75000"/>
@@ -962,9 +962,9 @@
                 </a:solidFill>
               </a:defRPr>
             </a:lvl7pPr>
-            <a:lvl8pPr marL="703768" indent="0">
-              <a:buNone/>
-              <a:defRPr sz="352">
+            <a:lvl8pPr marL="832104" indent="0">
+              <a:buNone/>
+              <a:defRPr sz="416">
                 <a:solidFill>
                   <a:schemeClr val="tx1">
                     <a:tint val="75000"/>
@@ -972,9 +972,9 @@
                 </a:solidFill>
               </a:defRPr>
             </a:lvl8pPr>
-            <a:lvl9pPr marL="804306" indent="0">
-              <a:buNone/>
-              <a:defRPr sz="352">
+            <a:lvl9pPr marL="950976" indent="0">
+              <a:buNone/>
+              <a:defRPr sz="416">
                 <a:solidFill>
                   <a:schemeClr val="tx1">
                     <a:tint val="75000"/>
@@ -1009,7 +1009,7 @@
           <a:p>
             <a:fld id="{CB11009B-BBC6-BD47-8F7A-6903AD4ACCCD}" type="datetimeFigureOut">
               <a:rPr lang="en-US" smtClean="0"/>
-              <a:t>6/4/19</a:t>
+              <a:t>6/9/19</a:t>
             </a:fld>
             <a:endParaRPr lang="en-US"/>
           </a:p>
@@ -1060,7 +1060,7 @@
     </p:spTree>
     <p:extLst>
       <p:ext uri="{BB962C8B-B14F-4D97-AF65-F5344CB8AC3E}">
-        <p14:creationId xmlns:p14="http://schemas.microsoft.com/office/powerpoint/2010/main" val="4278184060"/>
+        <p14:creationId xmlns:p14="http://schemas.microsoft.com/office/powerpoint/2010/main" val="260622349"/>
       </p:ext>
     </p:extLst>
   </p:cSld>
@@ -1122,8 +1122,8 @@
         </p:nvSpPr>
         <p:spPr>
           <a:xfrm>
-            <a:off x="462101" y="401469"/>
-            <a:ext cx="2856627" cy="956891"/>
+            <a:off x="462101" y="474578"/>
+            <a:ext cx="2856627" cy="1131147"/>
           </a:xfrm>
         </p:spPr>
         <p:txBody>
@@ -1179,8 +1179,8 @@
         </p:nvSpPr>
         <p:spPr>
           <a:xfrm>
-            <a:off x="3402747" y="401469"/>
-            <a:ext cx="2856627" cy="956891"/>
+            <a:off x="3402747" y="474578"/>
+            <a:ext cx="2856627" cy="1131147"/>
           </a:xfrm>
         </p:spPr>
         <p:txBody>
@@ -1241,7 +1241,7 @@
           <a:p>
             <a:fld id="{CB11009B-BBC6-BD47-8F7A-6903AD4ACCCD}" type="datetimeFigureOut">
               <a:rPr lang="en-US" smtClean="0"/>
-              <a:t>6/4/19</a:t>
+              <a:t>6/9/19</a:t>
             </a:fld>
             <a:endParaRPr lang="en-US"/>
           </a:p>
@@ -1292,7 +1292,7 @@
     </p:spTree>
     <p:extLst>
       <p:ext uri="{BB962C8B-B14F-4D97-AF65-F5344CB8AC3E}">
-        <p14:creationId xmlns:p14="http://schemas.microsoft.com/office/powerpoint/2010/main" val="3011558914"/>
+        <p14:creationId xmlns:p14="http://schemas.microsoft.com/office/powerpoint/2010/main" val="1668317643"/>
       </p:ext>
     </p:extLst>
   </p:cSld>
@@ -1331,8 +1331,8 @@
         </p:nvSpPr>
         <p:spPr>
           <a:xfrm>
-            <a:off x="462977" y="80294"/>
-            <a:ext cx="5797272" cy="291501"/>
+            <a:off x="462977" y="94916"/>
+            <a:ext cx="5797272" cy="344585"/>
           </a:xfrm>
         </p:spPr>
         <p:txBody>
@@ -1359,8 +1359,8 @@
         </p:nvSpPr>
         <p:spPr>
           <a:xfrm>
-            <a:off x="462977" y="369700"/>
-            <a:ext cx="2843499" cy="181184"/>
+            <a:off x="462977" y="437025"/>
+            <a:ext cx="2843499" cy="214179"/>
           </a:xfrm>
         </p:spPr>
         <p:txBody>
@@ -1368,39 +1368,39 @@
           <a:lstStyle>
             <a:lvl1pPr marL="0" indent="0">
               <a:buNone/>
-              <a:defRPr sz="528" b="1"/>
+              <a:defRPr sz="624" b="1"/>
             </a:lvl1pPr>
-            <a:lvl2pPr marL="100538" indent="0">
-              <a:buNone/>
-              <a:defRPr sz="440" b="1"/>
+            <a:lvl2pPr marL="118872" indent="0">
+              <a:buNone/>
+              <a:defRPr sz="520" b="1"/>
             </a:lvl2pPr>
-            <a:lvl3pPr marL="201077" indent="0">
-              <a:buNone/>
-              <a:defRPr sz="396" b="1"/>
+            <a:lvl3pPr marL="237744" indent="0">
+              <a:buNone/>
+              <a:defRPr sz="468" b="1"/>
             </a:lvl3pPr>
-            <a:lvl4pPr marL="301615" indent="0">
-              <a:buNone/>
-              <a:defRPr sz="352" b="1"/>
+            <a:lvl4pPr marL="356616" indent="0">
+              <a:buNone/>
+              <a:defRPr sz="416" b="1"/>
             </a:lvl4pPr>
-            <a:lvl5pPr marL="402153" indent="0">
-              <a:buNone/>
-              <a:defRPr sz="352" b="1"/>
+            <a:lvl5pPr marL="475488" indent="0">
+              <a:buNone/>
+              <a:defRPr sz="416" b="1"/>
             </a:lvl5pPr>
-            <a:lvl6pPr marL="502691" indent="0">
-              <a:buNone/>
-              <a:defRPr sz="352" b="1"/>
+            <a:lvl6pPr marL="594360" indent="0">
+              <a:buNone/>
+              <a:defRPr sz="416" b="1"/>
             </a:lvl6pPr>
-            <a:lvl7pPr marL="603230" indent="0">
-              <a:buNone/>
-              <a:defRPr sz="352" b="1"/>
+            <a:lvl7pPr marL="713232" indent="0">
+              <a:buNone/>
+              <a:defRPr sz="416" b="1"/>
             </a:lvl7pPr>
-            <a:lvl8pPr marL="703768" indent="0">
-              <a:buNone/>
-              <a:defRPr sz="352" b="1"/>
+            <a:lvl8pPr marL="832104" indent="0">
+              <a:buNone/>
+              <a:defRPr sz="416" b="1"/>
             </a:lvl8pPr>
-            <a:lvl9pPr marL="804306" indent="0">
-              <a:buNone/>
-              <a:defRPr sz="352" b="1"/>
+            <a:lvl9pPr marL="950976" indent="0">
+              <a:buNone/>
+              <a:defRPr sz="416" b="1"/>
             </a:lvl9pPr>
           </a:lstStyle>
           <a:p>
@@ -1424,8 +1424,8 @@
         </p:nvSpPr>
         <p:spPr>
           <a:xfrm>
-            <a:off x="462977" y="550885"/>
-            <a:ext cx="2843499" cy="810268"/>
+            <a:off x="462977" y="651203"/>
+            <a:ext cx="2843499" cy="957823"/>
           </a:xfrm>
         </p:spPr>
         <p:txBody>
@@ -1481,8 +1481,8 @@
         </p:nvSpPr>
         <p:spPr>
           <a:xfrm>
-            <a:off x="3402747" y="369700"/>
-            <a:ext cx="2857502" cy="181184"/>
+            <a:off x="3402747" y="437025"/>
+            <a:ext cx="2857502" cy="214179"/>
           </a:xfrm>
         </p:spPr>
         <p:txBody>
@@ -1490,39 +1490,39 @@
           <a:lstStyle>
             <a:lvl1pPr marL="0" indent="0">
               <a:buNone/>
-              <a:defRPr sz="528" b="1"/>
+              <a:defRPr sz="624" b="1"/>
             </a:lvl1pPr>
-            <a:lvl2pPr marL="100538" indent="0">
-              <a:buNone/>
-              <a:defRPr sz="440" b="1"/>
+            <a:lvl2pPr marL="118872" indent="0">
+              <a:buNone/>
+              <a:defRPr sz="520" b="1"/>
             </a:lvl2pPr>
-            <a:lvl3pPr marL="201077" indent="0">
-              <a:buNone/>
-              <a:defRPr sz="396" b="1"/>
+            <a:lvl3pPr marL="237744" indent="0">
+              <a:buNone/>
+              <a:defRPr sz="468" b="1"/>
             </a:lvl3pPr>
-            <a:lvl4pPr marL="301615" indent="0">
-              <a:buNone/>
-              <a:defRPr sz="352" b="1"/>
+            <a:lvl4pPr marL="356616" indent="0">
+              <a:buNone/>
+              <a:defRPr sz="416" b="1"/>
             </a:lvl4pPr>
-            <a:lvl5pPr marL="402153" indent="0">
-              <a:buNone/>
-              <a:defRPr sz="352" b="1"/>
+            <a:lvl5pPr marL="475488" indent="0">
+              <a:buNone/>
+              <a:defRPr sz="416" b="1"/>
             </a:lvl5pPr>
-            <a:lvl6pPr marL="502691" indent="0">
-              <a:buNone/>
-              <a:defRPr sz="352" b="1"/>
+            <a:lvl6pPr marL="594360" indent="0">
+              <a:buNone/>
+              <a:defRPr sz="416" b="1"/>
             </a:lvl6pPr>
-            <a:lvl7pPr marL="603230" indent="0">
-              <a:buNone/>
-              <a:defRPr sz="352" b="1"/>
+            <a:lvl7pPr marL="713232" indent="0">
+              <a:buNone/>
+              <a:defRPr sz="416" b="1"/>
             </a:lvl7pPr>
-            <a:lvl8pPr marL="703768" indent="0">
-              <a:buNone/>
-              <a:defRPr sz="352" b="1"/>
+            <a:lvl8pPr marL="832104" indent="0">
+              <a:buNone/>
+              <a:defRPr sz="416" b="1"/>
             </a:lvl8pPr>
-            <a:lvl9pPr marL="804306" indent="0">
-              <a:buNone/>
-              <a:defRPr sz="352" b="1"/>
+            <a:lvl9pPr marL="950976" indent="0">
+              <a:buNone/>
+              <a:defRPr sz="416" b="1"/>
             </a:lvl9pPr>
           </a:lstStyle>
           <a:p>
@@ -1546,8 +1546,8 @@
         </p:nvSpPr>
         <p:spPr>
           <a:xfrm>
-            <a:off x="3402747" y="550885"/>
-            <a:ext cx="2857502" cy="810268"/>
+            <a:off x="3402747" y="651203"/>
+            <a:ext cx="2857502" cy="957823"/>
           </a:xfrm>
         </p:spPr>
         <p:txBody>
@@ -1608,7 +1608,7 @@
           <a:p>
             <a:fld id="{CB11009B-BBC6-BD47-8F7A-6903AD4ACCCD}" type="datetimeFigureOut">
               <a:rPr lang="en-US" smtClean="0"/>
-              <a:t>6/4/19</a:t>
+              <a:t>6/9/19</a:t>
             </a:fld>
             <a:endParaRPr lang="en-US"/>
           </a:p>
@@ -1659,7 +1659,7 @@
     </p:spTree>
     <p:extLst>
       <p:ext uri="{BB962C8B-B14F-4D97-AF65-F5344CB8AC3E}">
-        <p14:creationId xmlns:p14="http://schemas.microsoft.com/office/powerpoint/2010/main" val="1298926783"/>
+        <p14:creationId xmlns:p14="http://schemas.microsoft.com/office/powerpoint/2010/main" val="2313678360"/>
       </p:ext>
     </p:extLst>
   </p:cSld>
@@ -1726,7 +1726,7 @@
           <a:p>
             <a:fld id="{CB11009B-BBC6-BD47-8F7A-6903AD4ACCCD}" type="datetimeFigureOut">
               <a:rPr lang="en-US" smtClean="0"/>
-              <a:t>6/4/19</a:t>
+              <a:t>6/9/19</a:t>
             </a:fld>
             <a:endParaRPr lang="en-US"/>
           </a:p>
@@ -1777,7 +1777,7 @@
     </p:spTree>
     <p:extLst>
       <p:ext uri="{BB962C8B-B14F-4D97-AF65-F5344CB8AC3E}">
-        <p14:creationId xmlns:p14="http://schemas.microsoft.com/office/powerpoint/2010/main" val="438511505"/>
+        <p14:creationId xmlns:p14="http://schemas.microsoft.com/office/powerpoint/2010/main" val="2477519320"/>
       </p:ext>
     </p:extLst>
   </p:cSld>
@@ -1821,7 +1821,7 @@
           <a:p>
             <a:fld id="{CB11009B-BBC6-BD47-8F7A-6903AD4ACCCD}" type="datetimeFigureOut">
               <a:rPr lang="en-US" smtClean="0"/>
-              <a:t>6/4/19</a:t>
+              <a:t>6/9/19</a:t>
             </a:fld>
             <a:endParaRPr lang="en-US"/>
           </a:p>
@@ -1872,7 +1872,7 @@
     </p:spTree>
     <p:extLst>
       <p:ext uri="{BB962C8B-B14F-4D97-AF65-F5344CB8AC3E}">
-        <p14:creationId xmlns:p14="http://schemas.microsoft.com/office/powerpoint/2010/main" val="86199699"/>
+        <p14:creationId xmlns:p14="http://schemas.microsoft.com/office/powerpoint/2010/main" val="1890837662"/>
       </p:ext>
     </p:extLst>
   </p:cSld>
@@ -1911,15 +1911,15 @@
         </p:nvSpPr>
         <p:spPr>
           <a:xfrm>
-            <a:off x="462977" y="100542"/>
-            <a:ext cx="2167850" cy="351896"/>
+            <a:off x="462977" y="118851"/>
+            <a:ext cx="2167850" cy="415978"/>
           </a:xfrm>
         </p:spPr>
         <p:txBody>
           <a:bodyPr anchor="b"/>
           <a:lstStyle>
             <a:lvl1pPr>
-              <a:defRPr sz="704"/>
+              <a:defRPr sz="832"/>
             </a:lvl1pPr>
           </a:lstStyle>
           <a:p>
@@ -1943,39 +1943,39 @@
         </p:nvSpPr>
         <p:spPr>
           <a:xfrm>
-            <a:off x="2857502" y="217142"/>
-            <a:ext cx="3402747" cy="1071746"/>
+            <a:off x="2857502" y="256685"/>
+            <a:ext cx="3402747" cy="1266917"/>
           </a:xfrm>
         </p:spPr>
         <p:txBody>
           <a:bodyPr/>
           <a:lstStyle>
             <a:lvl1pPr>
-              <a:defRPr sz="704"/>
+              <a:defRPr sz="832"/>
             </a:lvl1pPr>
             <a:lvl2pPr>
-              <a:defRPr sz="616"/>
+              <a:defRPr sz="728"/>
             </a:lvl2pPr>
             <a:lvl3pPr>
-              <a:defRPr sz="528"/>
+              <a:defRPr sz="624"/>
             </a:lvl3pPr>
             <a:lvl4pPr>
-              <a:defRPr sz="440"/>
+              <a:defRPr sz="520"/>
             </a:lvl4pPr>
             <a:lvl5pPr>
-              <a:defRPr sz="440"/>
+              <a:defRPr sz="520"/>
             </a:lvl5pPr>
             <a:lvl6pPr>
-              <a:defRPr sz="440"/>
+              <a:defRPr sz="520"/>
             </a:lvl6pPr>
             <a:lvl7pPr>
-              <a:defRPr sz="440"/>
+              <a:defRPr sz="520"/>
             </a:lvl7pPr>
             <a:lvl8pPr>
-              <a:defRPr sz="440"/>
+              <a:defRPr sz="520"/>
             </a:lvl8pPr>
             <a:lvl9pPr>
-              <a:defRPr sz="440"/>
+              <a:defRPr sz="520"/>
             </a:lvl9pPr>
           </a:lstStyle>
           <a:p>
@@ -2028,8 +2028,8 @@
         </p:nvSpPr>
         <p:spPr>
           <a:xfrm>
-            <a:off x="462977" y="452438"/>
-            <a:ext cx="2167850" cy="838196"/>
+            <a:off x="462977" y="534829"/>
+            <a:ext cx="2167850" cy="990837"/>
           </a:xfrm>
         </p:spPr>
         <p:txBody>
@@ -2037,39 +2037,39 @@
           <a:lstStyle>
             <a:lvl1pPr marL="0" indent="0">
               <a:buNone/>
-              <a:defRPr sz="352"/>
+              <a:defRPr sz="416"/>
             </a:lvl1pPr>
-            <a:lvl2pPr marL="100538" indent="0">
-              <a:buNone/>
-              <a:defRPr sz="308"/>
+            <a:lvl2pPr marL="118872" indent="0">
+              <a:buNone/>
+              <a:defRPr sz="364"/>
             </a:lvl2pPr>
-            <a:lvl3pPr marL="201077" indent="0">
-              <a:buNone/>
-              <a:defRPr sz="264"/>
+            <a:lvl3pPr marL="237744" indent="0">
+              <a:buNone/>
+              <a:defRPr sz="312"/>
             </a:lvl3pPr>
-            <a:lvl4pPr marL="301615" indent="0">
-              <a:buNone/>
-              <a:defRPr sz="220"/>
+            <a:lvl4pPr marL="356616" indent="0">
+              <a:buNone/>
+              <a:defRPr sz="260"/>
             </a:lvl4pPr>
-            <a:lvl5pPr marL="402153" indent="0">
-              <a:buNone/>
-              <a:defRPr sz="220"/>
+            <a:lvl5pPr marL="475488" indent="0">
+              <a:buNone/>
+              <a:defRPr sz="260"/>
             </a:lvl5pPr>
-            <a:lvl6pPr marL="502691" indent="0">
-              <a:buNone/>
-              <a:defRPr sz="220"/>
+            <a:lvl6pPr marL="594360" indent="0">
+              <a:buNone/>
+              <a:defRPr sz="260"/>
             </a:lvl6pPr>
-            <a:lvl7pPr marL="603230" indent="0">
-              <a:buNone/>
-              <a:defRPr sz="220"/>
+            <a:lvl7pPr marL="713232" indent="0">
+              <a:buNone/>
+              <a:defRPr sz="260"/>
             </a:lvl7pPr>
-            <a:lvl8pPr marL="703768" indent="0">
-              <a:buNone/>
-              <a:defRPr sz="220"/>
+            <a:lvl8pPr marL="832104" indent="0">
+              <a:buNone/>
+              <a:defRPr sz="260"/>
             </a:lvl8pPr>
-            <a:lvl9pPr marL="804306" indent="0">
-              <a:buNone/>
-              <a:defRPr sz="220"/>
+            <a:lvl9pPr marL="950976" indent="0">
+              <a:buNone/>
+              <a:defRPr sz="260"/>
             </a:lvl9pPr>
           </a:lstStyle>
           <a:p>
@@ -2098,7 +2098,7 @@
           <a:p>
             <a:fld id="{CB11009B-BBC6-BD47-8F7A-6903AD4ACCCD}" type="datetimeFigureOut">
               <a:rPr lang="en-US" smtClean="0"/>
-              <a:t>6/4/19</a:t>
+              <a:t>6/9/19</a:t>
             </a:fld>
             <a:endParaRPr lang="en-US"/>
           </a:p>
@@ -2149,7 +2149,7 @@
     </p:spTree>
     <p:extLst>
       <p:ext uri="{BB962C8B-B14F-4D97-AF65-F5344CB8AC3E}">
-        <p14:creationId xmlns:p14="http://schemas.microsoft.com/office/powerpoint/2010/main" val="1159590686"/>
+        <p14:creationId xmlns:p14="http://schemas.microsoft.com/office/powerpoint/2010/main" val="1772220722"/>
       </p:ext>
     </p:extLst>
   </p:cSld>
@@ -2188,15 +2188,15 @@
         </p:nvSpPr>
         <p:spPr>
           <a:xfrm>
-            <a:off x="462977" y="100542"/>
-            <a:ext cx="2167850" cy="351896"/>
+            <a:off x="462977" y="118851"/>
+            <a:ext cx="2167850" cy="415978"/>
           </a:xfrm>
         </p:spPr>
         <p:txBody>
           <a:bodyPr anchor="b"/>
           <a:lstStyle>
             <a:lvl1pPr>
-              <a:defRPr sz="704"/>
+              <a:defRPr sz="832"/>
             </a:lvl1pPr>
           </a:lstStyle>
           <a:p>
@@ -2220,8 +2220,8 @@
         </p:nvSpPr>
         <p:spPr>
           <a:xfrm>
-            <a:off x="2857502" y="217142"/>
-            <a:ext cx="3402747" cy="1071746"/>
+            <a:off x="2857502" y="256685"/>
+            <a:ext cx="3402747" cy="1266917"/>
           </a:xfrm>
         </p:spPr>
         <p:txBody>
@@ -2229,39 +2229,39 @@
           <a:lstStyle>
             <a:lvl1pPr marL="0" indent="0">
               <a:buNone/>
-              <a:defRPr sz="704"/>
+              <a:defRPr sz="832"/>
             </a:lvl1pPr>
-            <a:lvl2pPr marL="100538" indent="0">
-              <a:buNone/>
-              <a:defRPr sz="616"/>
+            <a:lvl2pPr marL="118872" indent="0">
+              <a:buNone/>
+              <a:defRPr sz="728"/>
             </a:lvl2pPr>
-            <a:lvl3pPr marL="201077" indent="0">
-              <a:buNone/>
-              <a:defRPr sz="528"/>
+            <a:lvl3pPr marL="237744" indent="0">
+              <a:buNone/>
+              <a:defRPr sz="624"/>
             </a:lvl3pPr>
-            <a:lvl4pPr marL="301615" indent="0">
-              <a:buNone/>
-              <a:defRPr sz="440"/>
+            <a:lvl4pPr marL="356616" indent="0">
+              <a:buNone/>
+              <a:defRPr sz="520"/>
             </a:lvl4pPr>
-            <a:lvl5pPr marL="402153" indent="0">
-              <a:buNone/>
-              <a:defRPr sz="440"/>
+            <a:lvl5pPr marL="475488" indent="0">
+              <a:buNone/>
+              <a:defRPr sz="520"/>
             </a:lvl5pPr>
-            <a:lvl6pPr marL="502691" indent="0">
-              <a:buNone/>
-              <a:defRPr sz="440"/>
+            <a:lvl6pPr marL="594360" indent="0">
+              <a:buNone/>
+              <a:defRPr sz="520"/>
             </a:lvl6pPr>
-            <a:lvl7pPr marL="603230" indent="0">
-              <a:buNone/>
-              <a:defRPr sz="440"/>
+            <a:lvl7pPr marL="713232" indent="0">
+              <a:buNone/>
+              <a:defRPr sz="520"/>
             </a:lvl7pPr>
-            <a:lvl8pPr marL="703768" indent="0">
-              <a:buNone/>
-              <a:defRPr sz="440"/>
+            <a:lvl8pPr marL="832104" indent="0">
+              <a:buNone/>
+              <a:defRPr sz="520"/>
             </a:lvl8pPr>
-            <a:lvl9pPr marL="804306" indent="0">
-              <a:buNone/>
-              <a:defRPr sz="440"/>
+            <a:lvl9pPr marL="950976" indent="0">
+              <a:buNone/>
+              <a:defRPr sz="520"/>
             </a:lvl9pPr>
           </a:lstStyle>
           <a:p>
@@ -2285,8 +2285,8 @@
         </p:nvSpPr>
         <p:spPr>
           <a:xfrm>
-            <a:off x="462977" y="452438"/>
-            <a:ext cx="2167850" cy="838196"/>
+            <a:off x="462977" y="534829"/>
+            <a:ext cx="2167850" cy="990837"/>
           </a:xfrm>
         </p:spPr>
         <p:txBody>
@@ -2294,39 +2294,39 @@
           <a:lstStyle>
             <a:lvl1pPr marL="0" indent="0">
               <a:buNone/>
-              <a:defRPr sz="352"/>
+              <a:defRPr sz="416"/>
             </a:lvl1pPr>
-            <a:lvl2pPr marL="100538" indent="0">
-              <a:buNone/>
-              <a:defRPr sz="308"/>
+            <a:lvl2pPr marL="118872" indent="0">
+              <a:buNone/>
+              <a:defRPr sz="364"/>
             </a:lvl2pPr>
-            <a:lvl3pPr marL="201077" indent="0">
-              <a:buNone/>
-              <a:defRPr sz="264"/>
+            <a:lvl3pPr marL="237744" indent="0">
+              <a:buNone/>
+              <a:defRPr sz="312"/>
             </a:lvl3pPr>
-            <a:lvl4pPr marL="301615" indent="0">
-              <a:buNone/>
-              <a:defRPr sz="220"/>
+            <a:lvl4pPr marL="356616" indent="0">
+              <a:buNone/>
+              <a:defRPr sz="260"/>
             </a:lvl4pPr>
-            <a:lvl5pPr marL="402153" indent="0">
-              <a:buNone/>
-              <a:defRPr sz="220"/>
+            <a:lvl5pPr marL="475488" indent="0">
+              <a:buNone/>
+              <a:defRPr sz="260"/>
             </a:lvl5pPr>
-            <a:lvl6pPr marL="502691" indent="0">
-              <a:buNone/>
-              <a:defRPr sz="220"/>
+            <a:lvl6pPr marL="594360" indent="0">
+              <a:buNone/>
+              <a:defRPr sz="260"/>
             </a:lvl6pPr>
-            <a:lvl7pPr marL="603230" indent="0">
-              <a:buNone/>
-              <a:defRPr sz="220"/>
+            <a:lvl7pPr marL="713232" indent="0">
+              <a:buNone/>
+              <a:defRPr sz="260"/>
             </a:lvl7pPr>
-            <a:lvl8pPr marL="703768" indent="0">
-              <a:buNone/>
-              <a:defRPr sz="220"/>
+            <a:lvl8pPr marL="832104" indent="0">
+              <a:buNone/>
+              <a:defRPr sz="260"/>
             </a:lvl8pPr>
-            <a:lvl9pPr marL="804306" indent="0">
-              <a:buNone/>
-              <a:defRPr sz="220"/>
+            <a:lvl9pPr marL="950976" indent="0">
+              <a:buNone/>
+              <a:defRPr sz="260"/>
             </a:lvl9pPr>
           </a:lstStyle>
           <a:p>
@@ -2355,7 +2355,7 @@
           <a:p>
             <a:fld id="{CB11009B-BBC6-BD47-8F7A-6903AD4ACCCD}" type="datetimeFigureOut">
               <a:rPr lang="en-US" smtClean="0"/>
-              <a:t>6/4/19</a:t>
+              <a:t>6/9/19</a:t>
             </a:fld>
             <a:endParaRPr lang="en-US"/>
           </a:p>
@@ -2406,7 +2406,7 @@
     </p:spTree>
     <p:extLst>
       <p:ext uri="{BB962C8B-B14F-4D97-AF65-F5344CB8AC3E}">
-        <p14:creationId xmlns:p14="http://schemas.microsoft.com/office/powerpoint/2010/main" val="1395881029"/>
+        <p14:creationId xmlns:p14="http://schemas.microsoft.com/office/powerpoint/2010/main" val="1695659367"/>
       </p:ext>
     </p:extLst>
   </p:cSld>
@@ -2450,8 +2450,8 @@
         </p:nvSpPr>
         <p:spPr>
           <a:xfrm>
-            <a:off x="462102" y="80294"/>
-            <a:ext cx="5797272" cy="291501"/>
+            <a:off x="462102" y="94916"/>
+            <a:ext cx="5797272" cy="344585"/>
           </a:xfrm>
           <a:prstGeom prst="rect">
             <a:avLst/>
@@ -2483,8 +2483,8 @@
         </p:nvSpPr>
         <p:spPr>
           <a:xfrm>
-            <a:off x="462102" y="401469"/>
-            <a:ext cx="5797272" cy="956891"/>
+            <a:off x="462102" y="474578"/>
+            <a:ext cx="5797272" cy="1131147"/>
           </a:xfrm>
           <a:prstGeom prst="rect">
             <a:avLst/>
@@ -2545,8 +2545,8 @@
         </p:nvSpPr>
         <p:spPr>
           <a:xfrm>
-            <a:off x="462101" y="1397808"/>
-            <a:ext cx="1512332" cy="80294"/>
+            <a:off x="462101" y="1652357"/>
+            <a:ext cx="1512332" cy="94916"/>
           </a:xfrm>
           <a:prstGeom prst="rect">
             <a:avLst/>
@@ -2556,7 +2556,7 @@
           <a:bodyPr vert="horz" lIns="91440" tIns="45720" rIns="91440" bIns="45720" rtlCol="0" anchor="ctr"/>
           <a:lstStyle>
             <a:lvl1pPr algn="l">
-              <a:defRPr sz="264">
+              <a:defRPr sz="312">
                 <a:solidFill>
                   <a:schemeClr val="tx1">
                     <a:tint val="75000"/>
@@ -2568,7 +2568,7 @@
           <a:p>
             <a:fld id="{CB11009B-BBC6-BD47-8F7A-6903AD4ACCCD}" type="datetimeFigureOut">
               <a:rPr lang="en-US" smtClean="0"/>
-              <a:t>6/4/19</a:t>
+              <a:t>6/9/19</a:t>
             </a:fld>
             <a:endParaRPr lang="en-US"/>
           </a:p>
@@ -2586,8 +2586,8 @@
         </p:nvSpPr>
         <p:spPr>
           <a:xfrm>
-            <a:off x="2226489" y="1397808"/>
-            <a:ext cx="2268498" cy="80294"/>
+            <a:off x="2226489" y="1652357"/>
+            <a:ext cx="2268498" cy="94916"/>
           </a:xfrm>
           <a:prstGeom prst="rect">
             <a:avLst/>
@@ -2597,7 +2597,7 @@
           <a:bodyPr vert="horz" lIns="91440" tIns="45720" rIns="91440" bIns="45720" rtlCol="0" anchor="ctr"/>
           <a:lstStyle>
             <a:lvl1pPr algn="ctr">
-              <a:defRPr sz="264">
+              <a:defRPr sz="312">
                 <a:solidFill>
                   <a:schemeClr val="tx1">
                     <a:tint val="75000"/>
@@ -2623,8 +2623,8 @@
         </p:nvSpPr>
         <p:spPr>
           <a:xfrm>
-            <a:off x="4747042" y="1397808"/>
-            <a:ext cx="1512332" cy="80294"/>
+            <a:off x="4747042" y="1652357"/>
+            <a:ext cx="1512332" cy="94916"/>
           </a:xfrm>
           <a:prstGeom prst="rect">
             <a:avLst/>
@@ -2634,7 +2634,7 @@
           <a:bodyPr vert="horz" lIns="91440" tIns="45720" rIns="91440" bIns="45720" rtlCol="0" anchor="ctr"/>
           <a:lstStyle>
             <a:lvl1pPr algn="r">
-              <a:defRPr sz="264">
+              <a:defRPr sz="312">
                 <a:solidFill>
                   <a:schemeClr val="tx1">
                     <a:tint val="75000"/>
@@ -2655,27 +2655,27 @@
     </p:spTree>
     <p:extLst>
       <p:ext uri="{BB962C8B-B14F-4D97-AF65-F5344CB8AC3E}">
-        <p14:creationId xmlns:p14="http://schemas.microsoft.com/office/powerpoint/2010/main" val="2335206318"/>
+        <p14:creationId xmlns:p14="http://schemas.microsoft.com/office/powerpoint/2010/main" val="2353580559"/>
       </p:ext>
     </p:extLst>
   </p:cSld>
   <p:clrMap bg1="lt1" tx1="dk1" bg2="lt2" tx2="dk2" accent1="accent1" accent2="accent2" accent3="accent3" accent4="accent4" accent5="accent5" accent6="accent6" hlink="hlink" folHlink="folHlink"/>
   <p:sldLayoutIdLst>
-    <p:sldLayoutId id="2147483769" r:id="rId1"/>
-    <p:sldLayoutId id="2147483770" r:id="rId2"/>
-    <p:sldLayoutId id="2147483771" r:id="rId3"/>
-    <p:sldLayoutId id="2147483772" r:id="rId4"/>
-    <p:sldLayoutId id="2147483773" r:id="rId5"/>
-    <p:sldLayoutId id="2147483774" r:id="rId6"/>
-    <p:sldLayoutId id="2147483775" r:id="rId7"/>
-    <p:sldLayoutId id="2147483776" r:id="rId8"/>
-    <p:sldLayoutId id="2147483777" r:id="rId9"/>
-    <p:sldLayoutId id="2147483778" r:id="rId10"/>
-    <p:sldLayoutId id="2147483779" r:id="rId11"/>
+    <p:sldLayoutId id="2147483793" r:id="rId1"/>
+    <p:sldLayoutId id="2147483794" r:id="rId2"/>
+    <p:sldLayoutId id="2147483795" r:id="rId3"/>
+    <p:sldLayoutId id="2147483796" r:id="rId4"/>
+    <p:sldLayoutId id="2147483797" r:id="rId5"/>
+    <p:sldLayoutId id="2147483798" r:id="rId6"/>
+    <p:sldLayoutId id="2147483799" r:id="rId7"/>
+    <p:sldLayoutId id="2147483800" r:id="rId8"/>
+    <p:sldLayoutId id="2147483801" r:id="rId9"/>
+    <p:sldLayoutId id="2147483802" r:id="rId10"/>
+    <p:sldLayoutId id="2147483803" r:id="rId11"/>
   </p:sldLayoutIdLst>
   <p:txStyles>
     <p:titleStyle>
-      <a:lvl1pPr algn="l" defTabSz="201077" rtl="0" eaLnBrk="1" latinLnBrk="0" hangingPunct="1">
+      <a:lvl1pPr algn="l" defTabSz="237744" rtl="0" eaLnBrk="1" latinLnBrk="0" hangingPunct="1">
         <a:lnSpc>
           <a:spcPct val="90000"/>
         </a:lnSpc>
@@ -2683,7 +2683,7 @@
           <a:spcPct val="0"/>
         </a:spcBef>
         <a:buNone/>
-        <a:defRPr sz="968" kern="1200">
+        <a:defRPr sz="1144" kern="1200">
           <a:solidFill>
             <a:schemeClr val="tx1"/>
           </a:solidFill>
@@ -2694,16 +2694,16 @@
       </a:lvl1pPr>
     </p:titleStyle>
     <p:bodyStyle>
-      <a:lvl1pPr marL="50269" indent="-50269" algn="l" defTabSz="201077" rtl="0" eaLnBrk="1" latinLnBrk="0" hangingPunct="1">
+      <a:lvl1pPr marL="59436" indent="-59436" algn="l" defTabSz="237744" rtl="0" eaLnBrk="1" latinLnBrk="0" hangingPunct="1">
         <a:lnSpc>
           <a:spcPct val="90000"/>
         </a:lnSpc>
         <a:spcBef>
-          <a:spcPts val="220"/>
+          <a:spcPts val="260"/>
         </a:spcBef>
         <a:buFont typeface="Arial" panose="020B0604020202020204" pitchFamily="34" charset="0"/>
         <a:buChar char="•"/>
-        <a:defRPr sz="616" kern="1200">
+        <a:defRPr sz="728" kern="1200">
           <a:solidFill>
             <a:schemeClr val="tx1"/>
           </a:solidFill>
@@ -2712,16 +2712,16 @@
           <a:cs typeface="+mn-cs"/>
         </a:defRPr>
       </a:lvl1pPr>
-      <a:lvl2pPr marL="150807" indent="-50269" algn="l" defTabSz="201077" rtl="0" eaLnBrk="1" latinLnBrk="0" hangingPunct="1">
+      <a:lvl2pPr marL="178308" indent="-59436" algn="l" defTabSz="237744" rtl="0" eaLnBrk="1" latinLnBrk="0" hangingPunct="1">
         <a:lnSpc>
           <a:spcPct val="90000"/>
         </a:lnSpc>
         <a:spcBef>
-          <a:spcPts val="110"/>
+          <a:spcPts val="130"/>
         </a:spcBef>
         <a:buFont typeface="Arial" panose="020B0604020202020204" pitchFamily="34" charset="0"/>
         <a:buChar char="•"/>
-        <a:defRPr sz="528" kern="1200">
+        <a:defRPr sz="624" kern="1200">
           <a:solidFill>
             <a:schemeClr val="tx1"/>
           </a:solidFill>
@@ -2730,16 +2730,16 @@
           <a:cs typeface="+mn-cs"/>
         </a:defRPr>
       </a:lvl2pPr>
-      <a:lvl3pPr marL="251346" indent="-50269" algn="l" defTabSz="201077" rtl="0" eaLnBrk="1" latinLnBrk="0" hangingPunct="1">
+      <a:lvl3pPr marL="297180" indent="-59436" algn="l" defTabSz="237744" rtl="0" eaLnBrk="1" latinLnBrk="0" hangingPunct="1">
         <a:lnSpc>
           <a:spcPct val="90000"/>
         </a:lnSpc>
         <a:spcBef>
-          <a:spcPts val="110"/>
+          <a:spcPts val="130"/>
         </a:spcBef>
         <a:buFont typeface="Arial" panose="020B0604020202020204" pitchFamily="34" charset="0"/>
         <a:buChar char="•"/>
-        <a:defRPr sz="440" kern="1200">
+        <a:defRPr sz="520" kern="1200">
           <a:solidFill>
             <a:schemeClr val="tx1"/>
           </a:solidFill>
@@ -2748,16 +2748,16 @@
           <a:cs typeface="+mn-cs"/>
         </a:defRPr>
       </a:lvl3pPr>
-      <a:lvl4pPr marL="351884" indent="-50269" algn="l" defTabSz="201077" rtl="0" eaLnBrk="1" latinLnBrk="0" hangingPunct="1">
+      <a:lvl4pPr marL="416052" indent="-59436" algn="l" defTabSz="237744" rtl="0" eaLnBrk="1" latinLnBrk="0" hangingPunct="1">
         <a:lnSpc>
           <a:spcPct val="90000"/>
         </a:lnSpc>
         <a:spcBef>
-          <a:spcPts val="110"/>
+          <a:spcPts val="130"/>
         </a:spcBef>
         <a:buFont typeface="Arial" panose="020B0604020202020204" pitchFamily="34" charset="0"/>
         <a:buChar char="•"/>
-        <a:defRPr sz="396" kern="1200">
+        <a:defRPr sz="468" kern="1200">
           <a:solidFill>
             <a:schemeClr val="tx1"/>
           </a:solidFill>
@@ -2766,16 +2766,16 @@
           <a:cs typeface="+mn-cs"/>
         </a:defRPr>
       </a:lvl4pPr>
-      <a:lvl5pPr marL="452422" indent="-50269" algn="l" defTabSz="201077" rtl="0" eaLnBrk="1" latinLnBrk="0" hangingPunct="1">
+      <a:lvl5pPr marL="534924" indent="-59436" algn="l" defTabSz="237744" rtl="0" eaLnBrk="1" latinLnBrk="0" hangingPunct="1">
         <a:lnSpc>
           <a:spcPct val="90000"/>
         </a:lnSpc>
         <a:spcBef>
-          <a:spcPts val="110"/>
+          <a:spcPts val="130"/>
         </a:spcBef>
         <a:buFont typeface="Arial" panose="020B0604020202020204" pitchFamily="34" charset="0"/>
         <a:buChar char="•"/>
-        <a:defRPr sz="396" kern="1200">
+        <a:defRPr sz="468" kern="1200">
           <a:solidFill>
             <a:schemeClr val="tx1"/>
           </a:solidFill>
@@ -2784,16 +2784,16 @@
           <a:cs typeface="+mn-cs"/>
         </a:defRPr>
       </a:lvl5pPr>
-      <a:lvl6pPr marL="552961" indent="-50269" algn="l" defTabSz="201077" rtl="0" eaLnBrk="1" latinLnBrk="0" hangingPunct="1">
+      <a:lvl6pPr marL="653796" indent="-59436" algn="l" defTabSz="237744" rtl="0" eaLnBrk="1" latinLnBrk="0" hangingPunct="1">
         <a:lnSpc>
           <a:spcPct val="90000"/>
         </a:lnSpc>
         <a:spcBef>
-          <a:spcPts val="110"/>
+          <a:spcPts val="130"/>
         </a:spcBef>
         <a:buFont typeface="Arial" panose="020B0604020202020204" pitchFamily="34" charset="0"/>
         <a:buChar char="•"/>
-        <a:defRPr sz="396" kern="1200">
+        <a:defRPr sz="468" kern="1200">
           <a:solidFill>
             <a:schemeClr val="tx1"/>
           </a:solidFill>
@@ -2802,16 +2802,16 @@
           <a:cs typeface="+mn-cs"/>
         </a:defRPr>
       </a:lvl6pPr>
-      <a:lvl7pPr marL="653499" indent="-50269" algn="l" defTabSz="201077" rtl="0" eaLnBrk="1" latinLnBrk="0" hangingPunct="1">
+      <a:lvl7pPr marL="772668" indent="-59436" algn="l" defTabSz="237744" rtl="0" eaLnBrk="1" latinLnBrk="0" hangingPunct="1">
         <a:lnSpc>
           <a:spcPct val="90000"/>
         </a:lnSpc>
         <a:spcBef>
-          <a:spcPts val="110"/>
+          <a:spcPts val="130"/>
         </a:spcBef>
         <a:buFont typeface="Arial" panose="020B0604020202020204" pitchFamily="34" charset="0"/>
         <a:buChar char="•"/>
-        <a:defRPr sz="396" kern="1200">
+        <a:defRPr sz="468" kern="1200">
           <a:solidFill>
             <a:schemeClr val="tx1"/>
           </a:solidFill>
@@ -2820,16 +2820,16 @@
           <a:cs typeface="+mn-cs"/>
         </a:defRPr>
       </a:lvl7pPr>
-      <a:lvl8pPr marL="754037" indent="-50269" algn="l" defTabSz="201077" rtl="0" eaLnBrk="1" latinLnBrk="0" hangingPunct="1">
+      <a:lvl8pPr marL="891540" indent="-59436" algn="l" defTabSz="237744" rtl="0" eaLnBrk="1" latinLnBrk="0" hangingPunct="1">
         <a:lnSpc>
           <a:spcPct val="90000"/>
         </a:lnSpc>
         <a:spcBef>
-          <a:spcPts val="110"/>
+          <a:spcPts val="130"/>
         </a:spcBef>
         <a:buFont typeface="Arial" panose="020B0604020202020204" pitchFamily="34" charset="0"/>
         <a:buChar char="•"/>
-        <a:defRPr sz="396" kern="1200">
+        <a:defRPr sz="468" kern="1200">
           <a:solidFill>
             <a:schemeClr val="tx1"/>
           </a:solidFill>
@@ -2838,16 +2838,16 @@
           <a:cs typeface="+mn-cs"/>
         </a:defRPr>
       </a:lvl8pPr>
-      <a:lvl9pPr marL="854575" indent="-50269" algn="l" defTabSz="201077" rtl="0" eaLnBrk="1" latinLnBrk="0" hangingPunct="1">
+      <a:lvl9pPr marL="1010412" indent="-59436" algn="l" defTabSz="237744" rtl="0" eaLnBrk="1" latinLnBrk="0" hangingPunct="1">
         <a:lnSpc>
           <a:spcPct val="90000"/>
         </a:lnSpc>
         <a:spcBef>
-          <a:spcPts val="110"/>
+          <a:spcPts val="130"/>
         </a:spcBef>
         <a:buFont typeface="Arial" panose="020B0604020202020204" pitchFamily="34" charset="0"/>
         <a:buChar char="•"/>
-        <a:defRPr sz="396" kern="1200">
+        <a:defRPr sz="468" kern="1200">
           <a:solidFill>
             <a:schemeClr val="tx1"/>
           </a:solidFill>
@@ -2861,8 +2861,8 @@
       <a:defPPr>
         <a:defRPr lang="en-US"/>
       </a:defPPr>
-      <a:lvl1pPr marL="0" algn="l" defTabSz="201077" rtl="0" eaLnBrk="1" latinLnBrk="0" hangingPunct="1">
-        <a:defRPr sz="396" kern="1200">
+      <a:lvl1pPr marL="0" algn="l" defTabSz="237744" rtl="0" eaLnBrk="1" latinLnBrk="0" hangingPunct="1">
+        <a:defRPr sz="468" kern="1200">
           <a:solidFill>
             <a:schemeClr val="tx1"/>
           </a:solidFill>
@@ -2871,8 +2871,8 @@
           <a:cs typeface="+mn-cs"/>
         </a:defRPr>
       </a:lvl1pPr>
-      <a:lvl2pPr marL="100538" algn="l" defTabSz="201077" rtl="0" eaLnBrk="1" latinLnBrk="0" hangingPunct="1">
-        <a:defRPr sz="396" kern="1200">
+      <a:lvl2pPr marL="118872" algn="l" defTabSz="237744" rtl="0" eaLnBrk="1" latinLnBrk="0" hangingPunct="1">
+        <a:defRPr sz="468" kern="1200">
           <a:solidFill>
             <a:schemeClr val="tx1"/>
           </a:solidFill>
@@ -2881,8 +2881,8 @@
           <a:cs typeface="+mn-cs"/>
         </a:defRPr>
       </a:lvl2pPr>
-      <a:lvl3pPr marL="201077" algn="l" defTabSz="201077" rtl="0" eaLnBrk="1" latinLnBrk="0" hangingPunct="1">
-        <a:defRPr sz="396" kern="1200">
+      <a:lvl3pPr marL="237744" algn="l" defTabSz="237744" rtl="0" eaLnBrk="1" latinLnBrk="0" hangingPunct="1">
+        <a:defRPr sz="468" kern="1200">
           <a:solidFill>
             <a:schemeClr val="tx1"/>
           </a:solidFill>
@@ -2891,8 +2891,8 @@
           <a:cs typeface="+mn-cs"/>
         </a:defRPr>
       </a:lvl3pPr>
-      <a:lvl4pPr marL="301615" algn="l" defTabSz="201077" rtl="0" eaLnBrk="1" latinLnBrk="0" hangingPunct="1">
-        <a:defRPr sz="396" kern="1200">
+      <a:lvl4pPr marL="356616" algn="l" defTabSz="237744" rtl="0" eaLnBrk="1" latinLnBrk="0" hangingPunct="1">
+        <a:defRPr sz="468" kern="1200">
           <a:solidFill>
             <a:schemeClr val="tx1"/>
           </a:solidFill>
@@ -2901,8 +2901,8 @@
           <a:cs typeface="+mn-cs"/>
         </a:defRPr>
       </a:lvl4pPr>
-      <a:lvl5pPr marL="402153" algn="l" defTabSz="201077" rtl="0" eaLnBrk="1" latinLnBrk="0" hangingPunct="1">
-        <a:defRPr sz="396" kern="1200">
+      <a:lvl5pPr marL="475488" algn="l" defTabSz="237744" rtl="0" eaLnBrk="1" latinLnBrk="0" hangingPunct="1">
+        <a:defRPr sz="468" kern="1200">
           <a:solidFill>
             <a:schemeClr val="tx1"/>
           </a:solidFill>
@@ -2911,8 +2911,8 @@
           <a:cs typeface="+mn-cs"/>
         </a:defRPr>
       </a:lvl5pPr>
-      <a:lvl6pPr marL="502691" algn="l" defTabSz="201077" rtl="0" eaLnBrk="1" latinLnBrk="0" hangingPunct="1">
-        <a:defRPr sz="396" kern="1200">
+      <a:lvl6pPr marL="594360" algn="l" defTabSz="237744" rtl="0" eaLnBrk="1" latinLnBrk="0" hangingPunct="1">
+        <a:defRPr sz="468" kern="1200">
           <a:solidFill>
             <a:schemeClr val="tx1"/>
           </a:solidFill>
@@ -2921,8 +2921,8 @@
           <a:cs typeface="+mn-cs"/>
         </a:defRPr>
       </a:lvl6pPr>
-      <a:lvl7pPr marL="603230" algn="l" defTabSz="201077" rtl="0" eaLnBrk="1" latinLnBrk="0" hangingPunct="1">
-        <a:defRPr sz="396" kern="1200">
+      <a:lvl7pPr marL="713232" algn="l" defTabSz="237744" rtl="0" eaLnBrk="1" latinLnBrk="0" hangingPunct="1">
+        <a:defRPr sz="468" kern="1200">
           <a:solidFill>
             <a:schemeClr val="tx1"/>
           </a:solidFill>
@@ -2931,8 +2931,8 @@
           <a:cs typeface="+mn-cs"/>
         </a:defRPr>
       </a:lvl7pPr>
-      <a:lvl8pPr marL="703768" algn="l" defTabSz="201077" rtl="0" eaLnBrk="1" latinLnBrk="0" hangingPunct="1">
-        <a:defRPr sz="396" kern="1200">
+      <a:lvl8pPr marL="832104" algn="l" defTabSz="237744" rtl="0" eaLnBrk="1" latinLnBrk="0" hangingPunct="1">
+        <a:defRPr sz="468" kern="1200">
           <a:solidFill>
             <a:schemeClr val="tx1"/>
           </a:solidFill>
@@ -2941,8 +2941,8 @@
           <a:cs typeface="+mn-cs"/>
         </a:defRPr>
       </a:lvl8pPr>
-      <a:lvl9pPr marL="804306" algn="l" defTabSz="201077" rtl="0" eaLnBrk="1" latinLnBrk="0" hangingPunct="1">
-        <a:defRPr sz="396" kern="1200">
+      <a:lvl9pPr marL="950976" algn="l" defTabSz="237744" rtl="0" eaLnBrk="1" latinLnBrk="0" hangingPunct="1">
+        <a:defRPr sz="468" kern="1200">
           <a:solidFill>
             <a:schemeClr val="tx1"/>
           </a:solidFill>
@@ -2987,8 +2987,8 @@
         </p:nvSpPr>
         <p:spPr>
           <a:xfrm>
-            <a:off x="30903" y="14020"/>
-            <a:ext cx="6647830" cy="1465803"/>
+            <a:off x="30903" y="10669"/>
+            <a:ext cx="6647830" cy="1733945"/>
           </a:xfrm>
           <a:prstGeom prst="rect">
             <a:avLst/>
@@ -3053,7 +3053,7 @@
         </p:nvSpPr>
         <p:spPr>
           <a:xfrm>
-            <a:off x="30906" y="1039410"/>
+            <a:off x="94577" y="1436837"/>
             <a:ext cx="2981807" cy="307777"/>
           </a:xfrm>
           <a:prstGeom prst="rect">
@@ -3081,12 +3081,56 @@
           </a:p>
         </p:txBody>
       </p:sp>
+      <p:cxnSp>
+        <p:nvCxnSpPr>
+          <p:cNvPr id="42" name="Straight Arrow Connector 41">
+            <a:extLst>
+              <a:ext uri="{FF2B5EF4-FFF2-40B4-BE49-F238E27FC236}">
+                <a16:creationId xmlns:a16="http://schemas.microsoft.com/office/drawing/2014/main" id="{BEEA5D0A-635F-5942-9F45-16C52D95F148}"/>
+              </a:ext>
+            </a:extLst>
+          </p:cNvPr>
+          <p:cNvCxnSpPr>
+            <a:cxnSpLocks/>
+          </p:cNvCxnSpPr>
+          <p:nvPr/>
+        </p:nvCxnSpPr>
+        <p:spPr>
+          <a:xfrm>
+            <a:off x="2687936" y="719555"/>
+            <a:ext cx="563899" cy="0"/>
+          </a:xfrm>
+          <a:prstGeom prst="straightConnector1">
+            <a:avLst/>
+          </a:prstGeom>
+          <a:ln w="31750">
+            <a:solidFill>
+              <a:schemeClr val="tx1"/>
+            </a:solidFill>
+            <a:tailEnd type="triangle"/>
+          </a:ln>
+        </p:spPr>
+        <p:style>
+          <a:lnRef idx="1">
+            <a:schemeClr val="accent1"/>
+          </a:lnRef>
+          <a:fillRef idx="0">
+            <a:schemeClr val="accent1"/>
+          </a:fillRef>
+          <a:effectRef idx="0">
+            <a:schemeClr val="accent1"/>
+          </a:effectRef>
+          <a:fontRef idx="minor">
+            <a:schemeClr val="tx1"/>
+          </a:fontRef>
+        </p:style>
+      </p:cxnSp>
       <p:graphicFrame>
         <p:nvGraphicFramePr>
-          <p:cNvPr id="30" name="Table 29">
+          <p:cNvPr id="43" name="Table 42">
             <a:extLst>
               <a:ext uri="{FF2B5EF4-FFF2-40B4-BE49-F238E27FC236}">
-                <a16:creationId xmlns:a16="http://schemas.microsoft.com/office/drawing/2014/main" id="{F8D9DA64-C349-0B49-9DF9-B6547A945311}"/>
+                <a16:creationId xmlns:a16="http://schemas.microsoft.com/office/drawing/2014/main" id="{33006E08-EC01-1C47-8C15-CF1CF88A2AA8}"/>
               </a:ext>
             </a:extLst>
           </p:cNvPr>
@@ -3096,13 +3140,13 @@
           <p:nvPr>
             <p:extLst>
               <p:ext uri="{D42A27DB-BD31-4B8C-83A1-F6EECF244321}">
-                <p14:modId xmlns:p14="http://schemas.microsoft.com/office/powerpoint/2010/main" val="1831457007"/>
+                <p14:modId xmlns:p14="http://schemas.microsoft.com/office/powerpoint/2010/main" val="1715225710"/>
               </p:ext>
             </p:extLst>
           </p:nvPr>
         </p:nvGraphicFramePr>
         <p:xfrm>
-          <a:off x="279480" y="536027"/>
+          <a:off x="3448338" y="535598"/>
           <a:ext cx="125002" cy="384435"/>
         </p:xfrm>
         <a:graphic>
@@ -3196,954 +3240,6 @@
           </a:graphicData>
         </a:graphic>
       </p:graphicFrame>
-      <p:graphicFrame>
-        <p:nvGraphicFramePr>
-          <p:cNvPr id="31" name="Table 30">
-            <a:extLst>
-              <a:ext uri="{FF2B5EF4-FFF2-40B4-BE49-F238E27FC236}">
-                <a16:creationId xmlns:a16="http://schemas.microsoft.com/office/drawing/2014/main" id="{BE986189-9F55-9E45-956A-2BD698A091FD}"/>
-              </a:ext>
-            </a:extLst>
-          </p:cNvPr>
-          <p:cNvGraphicFramePr>
-            <a:graphicFrameLocks noGrp="1"/>
-          </p:cNvGraphicFramePr>
-          <p:nvPr>
-            <p:extLst>
-              <p:ext uri="{D42A27DB-BD31-4B8C-83A1-F6EECF244321}">
-                <p14:modId xmlns:p14="http://schemas.microsoft.com/office/powerpoint/2010/main" val="114789470"/>
-              </p:ext>
-            </p:extLst>
-          </p:nvPr>
-        </p:nvGraphicFramePr>
-        <p:xfrm>
-          <a:off x="801690" y="536024"/>
-          <a:ext cx="125002" cy="384435"/>
-        </p:xfrm>
-        <a:graphic>
-          <a:graphicData uri="http://schemas.openxmlformats.org/drawingml/2006/table">
-            <a:tbl>
-              <a:tblPr firstRow="1" bandRow="1">
-                <a:tableStyleId>{5940675A-B579-460E-94D1-54222C63F5DA}</a:tableStyleId>
-              </a:tblPr>
-              <a:tblGrid>
-                <a:gridCol w="125002">
-                  <a:extLst>
-                    <a:ext uri="{9D8B030D-6E8A-4147-A177-3AD203B41FA5}">
-                      <a16:colId xmlns:a16="http://schemas.microsoft.com/office/drawing/2014/main" val="20000"/>
-                    </a:ext>
-                  </a:extLst>
-                </a:gridCol>
-              </a:tblGrid>
-              <a:tr h="128145">
-                <a:tc>
-                  <a:txBody>
-                    <a:bodyPr/>
-                    <a:lstStyle/>
-                    <a:p>
-                      <a:pPr algn="ctr"/>
-                      <a:endParaRPr lang="en-US" sz="500" dirty="0"/>
-                    </a:p>
-                  </a:txBody>
-                  <a:tcPr marL="25604" marR="25604" marT="12802" marB="12802" anchor="ctr">
-                    <a:solidFill>
-                      <a:srgbClr val="00B050">
-                        <a:alpha val="30000"/>
-                      </a:srgbClr>
-                    </a:solidFill>
-                  </a:tcPr>
-                </a:tc>
-                <a:extLst>
-                  <a:ext uri="{0D108BD9-81ED-4DB2-BD59-A6C34878D82A}">
-                    <a16:rowId xmlns:a16="http://schemas.microsoft.com/office/drawing/2014/main" val="3355847617"/>
-                  </a:ext>
-                </a:extLst>
-              </a:tr>
-              <a:tr h="128145">
-                <a:tc>
-                  <a:txBody>
-                    <a:bodyPr/>
-                    <a:lstStyle/>
-                    <a:p>
-                      <a:pPr algn="ctr"/>
-                      <a:endParaRPr lang="en-US" sz="500" dirty="0"/>
-                    </a:p>
-                  </a:txBody>
-                  <a:tcPr marL="25604" marR="25604" marT="12802" marB="12802" anchor="ctr">
-                    <a:solidFill>
-                      <a:srgbClr val="00B050">
-                        <a:alpha val="30000"/>
-                      </a:srgbClr>
-                    </a:solidFill>
-                  </a:tcPr>
-                </a:tc>
-                <a:extLst>
-                  <a:ext uri="{0D108BD9-81ED-4DB2-BD59-A6C34878D82A}">
-                    <a16:rowId xmlns:a16="http://schemas.microsoft.com/office/drawing/2014/main" val="916629886"/>
-                  </a:ext>
-                </a:extLst>
-              </a:tr>
-              <a:tr h="128145">
-                <a:tc>
-                  <a:txBody>
-                    <a:bodyPr/>
-                    <a:lstStyle/>
-                    <a:p>
-                      <a:pPr algn="ctr"/>
-                      <a:endParaRPr lang="en-US" sz="500" dirty="0"/>
-                    </a:p>
-                  </a:txBody>
-                  <a:tcPr marL="25604" marR="25604" marT="12802" marB="12802" anchor="ctr">
-                    <a:solidFill>
-                      <a:srgbClr val="00B050">
-                        <a:alpha val="30000"/>
-                      </a:srgbClr>
-                    </a:solidFill>
-                  </a:tcPr>
-                </a:tc>
-                <a:extLst>
-                  <a:ext uri="{0D108BD9-81ED-4DB2-BD59-A6C34878D82A}">
-                    <a16:rowId xmlns:a16="http://schemas.microsoft.com/office/drawing/2014/main" val="893773089"/>
-                  </a:ext>
-                </a:extLst>
-              </a:tr>
-            </a:tbl>
-          </a:graphicData>
-        </a:graphic>
-      </p:graphicFrame>
-      <p:graphicFrame>
-        <p:nvGraphicFramePr>
-          <p:cNvPr id="32" name="Table 31">
-            <a:extLst>
-              <a:ext uri="{FF2B5EF4-FFF2-40B4-BE49-F238E27FC236}">
-                <a16:creationId xmlns:a16="http://schemas.microsoft.com/office/drawing/2014/main" id="{4AEDE8E7-096E-1A4D-8DE4-D6FC6F080449}"/>
-              </a:ext>
-            </a:extLst>
-          </p:cNvPr>
-          <p:cNvGraphicFramePr>
-            <a:graphicFrameLocks noGrp="1"/>
-          </p:cNvGraphicFramePr>
-          <p:nvPr>
-            <p:extLst>
-              <p:ext uri="{D42A27DB-BD31-4B8C-83A1-F6EECF244321}">
-                <p14:modId xmlns:p14="http://schemas.microsoft.com/office/powerpoint/2010/main" val="1361451193"/>
-              </p:ext>
-            </p:extLst>
-          </p:nvPr>
-        </p:nvGraphicFramePr>
-        <p:xfrm>
-          <a:off x="1318596" y="538952"/>
-          <a:ext cx="125002" cy="384435"/>
-        </p:xfrm>
-        <a:graphic>
-          <a:graphicData uri="http://schemas.openxmlformats.org/drawingml/2006/table">
-            <a:tbl>
-              <a:tblPr firstRow="1" bandRow="1">
-                <a:tableStyleId>{5940675A-B579-460E-94D1-54222C63F5DA}</a:tableStyleId>
-              </a:tblPr>
-              <a:tblGrid>
-                <a:gridCol w="125002">
-                  <a:extLst>
-                    <a:ext uri="{9D8B030D-6E8A-4147-A177-3AD203B41FA5}">
-                      <a16:colId xmlns:a16="http://schemas.microsoft.com/office/drawing/2014/main" val="20000"/>
-                    </a:ext>
-                  </a:extLst>
-                </a:gridCol>
-              </a:tblGrid>
-              <a:tr h="128145">
-                <a:tc>
-                  <a:txBody>
-                    <a:bodyPr/>
-                    <a:lstStyle/>
-                    <a:p>
-                      <a:pPr algn="ctr"/>
-                      <a:endParaRPr lang="en-US" sz="500" dirty="0"/>
-                    </a:p>
-                  </a:txBody>
-                  <a:tcPr marL="25604" marR="25604" marT="12802" marB="12802" anchor="ctr">
-                    <a:solidFill>
-                      <a:srgbClr val="00B050">
-                        <a:alpha val="30000"/>
-                      </a:srgbClr>
-                    </a:solidFill>
-                  </a:tcPr>
-                </a:tc>
-                <a:extLst>
-                  <a:ext uri="{0D108BD9-81ED-4DB2-BD59-A6C34878D82A}">
-                    <a16:rowId xmlns:a16="http://schemas.microsoft.com/office/drawing/2014/main" val="3355847617"/>
-                  </a:ext>
-                </a:extLst>
-              </a:tr>
-              <a:tr h="128145">
-                <a:tc>
-                  <a:txBody>
-                    <a:bodyPr/>
-                    <a:lstStyle/>
-                    <a:p>
-                      <a:pPr algn="ctr"/>
-                      <a:endParaRPr lang="en-US" sz="500" dirty="0"/>
-                    </a:p>
-                  </a:txBody>
-                  <a:tcPr marL="25604" marR="25604" marT="12802" marB="12802" anchor="ctr">
-                    <a:solidFill>
-                      <a:srgbClr val="00B050">
-                        <a:alpha val="30000"/>
-                      </a:srgbClr>
-                    </a:solidFill>
-                  </a:tcPr>
-                </a:tc>
-                <a:extLst>
-                  <a:ext uri="{0D108BD9-81ED-4DB2-BD59-A6C34878D82A}">
-                    <a16:rowId xmlns:a16="http://schemas.microsoft.com/office/drawing/2014/main" val="916629886"/>
-                  </a:ext>
-                </a:extLst>
-              </a:tr>
-              <a:tr h="128145">
-                <a:tc>
-                  <a:txBody>
-                    <a:bodyPr/>
-                    <a:lstStyle/>
-                    <a:p>
-                      <a:pPr algn="ctr"/>
-                      <a:endParaRPr lang="en-US" sz="500" dirty="0"/>
-                    </a:p>
-                  </a:txBody>
-                  <a:tcPr marL="25604" marR="25604" marT="12802" marB="12802" anchor="ctr">
-                    <a:solidFill>
-                      <a:srgbClr val="00B050">
-                        <a:alpha val="30000"/>
-                      </a:srgbClr>
-                    </a:solidFill>
-                  </a:tcPr>
-                </a:tc>
-                <a:extLst>
-                  <a:ext uri="{0D108BD9-81ED-4DB2-BD59-A6C34878D82A}">
-                    <a16:rowId xmlns:a16="http://schemas.microsoft.com/office/drawing/2014/main" val="893773089"/>
-                  </a:ext>
-                </a:extLst>
-              </a:tr>
-            </a:tbl>
-          </a:graphicData>
-        </a:graphic>
-      </p:graphicFrame>
-      <p:graphicFrame>
-        <p:nvGraphicFramePr>
-          <p:cNvPr id="33" name="Table 32">
-            <a:extLst>
-              <a:ext uri="{FF2B5EF4-FFF2-40B4-BE49-F238E27FC236}">
-                <a16:creationId xmlns:a16="http://schemas.microsoft.com/office/drawing/2014/main" id="{3E1762C8-9672-F74B-8E5A-B69CD2C6ECB3}"/>
-              </a:ext>
-            </a:extLst>
-          </p:cNvPr>
-          <p:cNvGraphicFramePr>
-            <a:graphicFrameLocks noGrp="1"/>
-          </p:cNvGraphicFramePr>
-          <p:nvPr>
-            <p:extLst>
-              <p:ext uri="{D42A27DB-BD31-4B8C-83A1-F6EECF244321}">
-                <p14:modId xmlns:p14="http://schemas.microsoft.com/office/powerpoint/2010/main" val="3710166887"/>
-              </p:ext>
-            </p:extLst>
-          </p:nvPr>
-        </p:nvGraphicFramePr>
-        <p:xfrm>
-          <a:off x="1840806" y="536024"/>
-          <a:ext cx="125002" cy="384435"/>
-        </p:xfrm>
-        <a:graphic>
-          <a:graphicData uri="http://schemas.openxmlformats.org/drawingml/2006/table">
-            <a:tbl>
-              <a:tblPr firstRow="1" bandRow="1">
-                <a:tableStyleId>{5940675A-B579-460E-94D1-54222C63F5DA}</a:tableStyleId>
-              </a:tblPr>
-              <a:tblGrid>
-                <a:gridCol w="125002">
-                  <a:extLst>
-                    <a:ext uri="{9D8B030D-6E8A-4147-A177-3AD203B41FA5}">
-                      <a16:colId xmlns:a16="http://schemas.microsoft.com/office/drawing/2014/main" val="20000"/>
-                    </a:ext>
-                  </a:extLst>
-                </a:gridCol>
-              </a:tblGrid>
-              <a:tr h="128145">
-                <a:tc>
-                  <a:txBody>
-                    <a:bodyPr/>
-                    <a:lstStyle/>
-                    <a:p>
-                      <a:pPr algn="ctr"/>
-                      <a:endParaRPr lang="en-US" sz="500" dirty="0"/>
-                    </a:p>
-                  </a:txBody>
-                  <a:tcPr marL="25604" marR="25604" marT="12802" marB="12802" anchor="ctr">
-                    <a:solidFill>
-                      <a:srgbClr val="00B050">
-                        <a:alpha val="30000"/>
-                      </a:srgbClr>
-                    </a:solidFill>
-                  </a:tcPr>
-                </a:tc>
-                <a:extLst>
-                  <a:ext uri="{0D108BD9-81ED-4DB2-BD59-A6C34878D82A}">
-                    <a16:rowId xmlns:a16="http://schemas.microsoft.com/office/drawing/2014/main" val="3355847617"/>
-                  </a:ext>
-                </a:extLst>
-              </a:tr>
-              <a:tr h="128145">
-                <a:tc>
-                  <a:txBody>
-                    <a:bodyPr/>
-                    <a:lstStyle/>
-                    <a:p>
-                      <a:pPr algn="ctr"/>
-                      <a:endParaRPr lang="en-US" sz="500" dirty="0"/>
-                    </a:p>
-                  </a:txBody>
-                  <a:tcPr marL="25604" marR="25604" marT="12802" marB="12802" anchor="ctr">
-                    <a:solidFill>
-                      <a:srgbClr val="00B050">
-                        <a:alpha val="30000"/>
-                      </a:srgbClr>
-                    </a:solidFill>
-                  </a:tcPr>
-                </a:tc>
-                <a:extLst>
-                  <a:ext uri="{0D108BD9-81ED-4DB2-BD59-A6C34878D82A}">
-                    <a16:rowId xmlns:a16="http://schemas.microsoft.com/office/drawing/2014/main" val="916629886"/>
-                  </a:ext>
-                </a:extLst>
-              </a:tr>
-              <a:tr h="128145">
-                <a:tc>
-                  <a:txBody>
-                    <a:bodyPr/>
-                    <a:lstStyle/>
-                    <a:p>
-                      <a:pPr algn="ctr"/>
-                      <a:endParaRPr lang="en-US" sz="500" dirty="0"/>
-                    </a:p>
-                  </a:txBody>
-                  <a:tcPr marL="25604" marR="25604" marT="12802" marB="12802" anchor="ctr">
-                    <a:solidFill>
-                      <a:srgbClr val="00B050">
-                        <a:alpha val="30000"/>
-                      </a:srgbClr>
-                    </a:solidFill>
-                  </a:tcPr>
-                </a:tc>
-                <a:extLst>
-                  <a:ext uri="{0D108BD9-81ED-4DB2-BD59-A6C34878D82A}">
-                    <a16:rowId xmlns:a16="http://schemas.microsoft.com/office/drawing/2014/main" val="893773089"/>
-                  </a:ext>
-                </a:extLst>
-              </a:tr>
-            </a:tbl>
-          </a:graphicData>
-        </a:graphic>
-      </p:graphicFrame>
-      <p:graphicFrame>
-        <p:nvGraphicFramePr>
-          <p:cNvPr id="34" name="Table 33">
-            <a:extLst>
-              <a:ext uri="{FF2B5EF4-FFF2-40B4-BE49-F238E27FC236}">
-                <a16:creationId xmlns:a16="http://schemas.microsoft.com/office/drawing/2014/main" id="{401F481A-46D3-DD47-BE8D-5DE78FE3317B}"/>
-              </a:ext>
-            </a:extLst>
-          </p:cNvPr>
-          <p:cNvGraphicFramePr>
-            <a:graphicFrameLocks noGrp="1"/>
-          </p:cNvGraphicFramePr>
-          <p:nvPr>
-            <p:extLst>
-              <p:ext uri="{D42A27DB-BD31-4B8C-83A1-F6EECF244321}">
-                <p14:modId xmlns:p14="http://schemas.microsoft.com/office/powerpoint/2010/main" val="2752448282"/>
-              </p:ext>
-            </p:extLst>
-          </p:nvPr>
-        </p:nvGraphicFramePr>
-        <p:xfrm>
-          <a:off x="2356672" y="536024"/>
-          <a:ext cx="125002" cy="384435"/>
-        </p:xfrm>
-        <a:graphic>
-          <a:graphicData uri="http://schemas.openxmlformats.org/drawingml/2006/table">
-            <a:tbl>
-              <a:tblPr firstRow="1" bandRow="1">
-                <a:tableStyleId>{5940675A-B579-460E-94D1-54222C63F5DA}</a:tableStyleId>
-              </a:tblPr>
-              <a:tblGrid>
-                <a:gridCol w="125002">
-                  <a:extLst>
-                    <a:ext uri="{9D8B030D-6E8A-4147-A177-3AD203B41FA5}">
-                      <a16:colId xmlns:a16="http://schemas.microsoft.com/office/drawing/2014/main" val="20000"/>
-                    </a:ext>
-                  </a:extLst>
-                </a:gridCol>
-              </a:tblGrid>
-              <a:tr h="128145">
-                <a:tc>
-                  <a:txBody>
-                    <a:bodyPr/>
-                    <a:lstStyle/>
-                    <a:p>
-                      <a:pPr algn="ctr"/>
-                      <a:endParaRPr lang="en-US" sz="500" dirty="0"/>
-                    </a:p>
-                  </a:txBody>
-                  <a:tcPr marL="25604" marR="25604" marT="12802" marB="12802" anchor="ctr">
-                    <a:solidFill>
-                      <a:srgbClr val="00B050">
-                        <a:alpha val="30000"/>
-                      </a:srgbClr>
-                    </a:solidFill>
-                  </a:tcPr>
-                </a:tc>
-                <a:extLst>
-                  <a:ext uri="{0D108BD9-81ED-4DB2-BD59-A6C34878D82A}">
-                    <a16:rowId xmlns:a16="http://schemas.microsoft.com/office/drawing/2014/main" val="3355847617"/>
-                  </a:ext>
-                </a:extLst>
-              </a:tr>
-              <a:tr h="128145">
-                <a:tc>
-                  <a:txBody>
-                    <a:bodyPr/>
-                    <a:lstStyle/>
-                    <a:p>
-                      <a:pPr algn="ctr"/>
-                      <a:endParaRPr lang="en-US" sz="500" dirty="0"/>
-                    </a:p>
-                  </a:txBody>
-                  <a:tcPr marL="25604" marR="25604" marT="12802" marB="12802" anchor="ctr">
-                    <a:solidFill>
-                      <a:srgbClr val="00B050">
-                        <a:alpha val="30000"/>
-                      </a:srgbClr>
-                    </a:solidFill>
-                  </a:tcPr>
-                </a:tc>
-                <a:extLst>
-                  <a:ext uri="{0D108BD9-81ED-4DB2-BD59-A6C34878D82A}">
-                    <a16:rowId xmlns:a16="http://schemas.microsoft.com/office/drawing/2014/main" val="916629886"/>
-                  </a:ext>
-                </a:extLst>
-              </a:tr>
-              <a:tr h="128145">
-                <a:tc>
-                  <a:txBody>
-                    <a:bodyPr/>
-                    <a:lstStyle/>
-                    <a:p>
-                      <a:pPr algn="ctr"/>
-                      <a:endParaRPr lang="en-US" sz="500" dirty="0"/>
-                    </a:p>
-                  </a:txBody>
-                  <a:tcPr marL="25604" marR="25604" marT="12802" marB="12802" anchor="ctr">
-                    <a:solidFill>
-                      <a:srgbClr val="00B050">
-                        <a:alpha val="30000"/>
-                      </a:srgbClr>
-                    </a:solidFill>
-                  </a:tcPr>
-                </a:tc>
-                <a:extLst>
-                  <a:ext uri="{0D108BD9-81ED-4DB2-BD59-A6C34878D82A}">
-                    <a16:rowId xmlns:a16="http://schemas.microsoft.com/office/drawing/2014/main" val="893773089"/>
-                  </a:ext>
-                </a:extLst>
-              </a:tr>
-            </a:tbl>
-          </a:graphicData>
-        </a:graphic>
-      </p:graphicFrame>
-      <p:sp>
-        <p:nvSpPr>
-          <p:cNvPr id="36" name="Cross 35">
-            <a:extLst>
-              <a:ext uri="{FF2B5EF4-FFF2-40B4-BE49-F238E27FC236}">
-                <a16:creationId xmlns:a16="http://schemas.microsoft.com/office/drawing/2014/main" id="{4F8B61FA-9D45-3F44-A83F-EFA5AF67DF39}"/>
-              </a:ext>
-            </a:extLst>
-          </p:cNvPr>
-          <p:cNvSpPr/>
-          <p:nvPr/>
-        </p:nvSpPr>
-        <p:spPr>
-          <a:xfrm>
-            <a:off x="543362" y="681069"/>
-            <a:ext cx="94343" cy="94343"/>
-          </a:xfrm>
-          <a:prstGeom prst="plus">
-            <a:avLst>
-              <a:gd name="adj" fmla="val 41102"/>
-            </a:avLst>
-          </a:prstGeom>
-          <a:solidFill>
-            <a:schemeClr val="tx1"/>
-          </a:solidFill>
-          <a:ln>
-            <a:noFill/>
-          </a:ln>
-        </p:spPr>
-        <p:style>
-          <a:lnRef idx="2">
-            <a:schemeClr val="accent1">
-              <a:shade val="50000"/>
-            </a:schemeClr>
-          </a:lnRef>
-          <a:fillRef idx="1">
-            <a:schemeClr val="accent1"/>
-          </a:fillRef>
-          <a:effectRef idx="0">
-            <a:schemeClr val="accent1"/>
-          </a:effectRef>
-          <a:fontRef idx="minor">
-            <a:schemeClr val="lt1"/>
-          </a:fontRef>
-        </p:style>
-        <p:txBody>
-          <a:bodyPr rot="0" spcFirstLastPara="0" vertOverflow="overflow" horzOverflow="overflow" vert="horz" wrap="square" lIns="91440" tIns="45720" rIns="91440" bIns="45720" numCol="1" spcCol="0" rtlCol="0" fromWordArt="0" anchor="ctr" anchorCtr="0" forceAA="0" compatLnSpc="1">
-            <a:prstTxWarp prst="textNoShape">
-              <a:avLst/>
-            </a:prstTxWarp>
-            <a:noAutofit/>
-          </a:bodyPr>
-          <a:lstStyle/>
-          <a:p>
-            <a:pPr algn="ctr"/>
-            <a:endParaRPr lang="en-US"/>
-          </a:p>
-        </p:txBody>
-      </p:sp>
-      <p:sp>
-        <p:nvSpPr>
-          <p:cNvPr id="37" name="Cross 36">
-            <a:extLst>
-              <a:ext uri="{FF2B5EF4-FFF2-40B4-BE49-F238E27FC236}">
-                <a16:creationId xmlns:a16="http://schemas.microsoft.com/office/drawing/2014/main" id="{FFF17F8D-DF27-B846-AF7F-B225947EA23D}"/>
-              </a:ext>
-            </a:extLst>
-          </p:cNvPr>
-          <p:cNvSpPr/>
-          <p:nvPr/>
-        </p:nvSpPr>
-        <p:spPr>
-          <a:xfrm>
-            <a:off x="1072837" y="681069"/>
-            <a:ext cx="94343" cy="94343"/>
-          </a:xfrm>
-          <a:prstGeom prst="plus">
-            <a:avLst>
-              <a:gd name="adj" fmla="val 41102"/>
-            </a:avLst>
-          </a:prstGeom>
-          <a:solidFill>
-            <a:schemeClr val="tx1"/>
-          </a:solidFill>
-          <a:ln>
-            <a:noFill/>
-          </a:ln>
-        </p:spPr>
-        <p:style>
-          <a:lnRef idx="2">
-            <a:schemeClr val="accent1">
-              <a:shade val="50000"/>
-            </a:schemeClr>
-          </a:lnRef>
-          <a:fillRef idx="1">
-            <a:schemeClr val="accent1"/>
-          </a:fillRef>
-          <a:effectRef idx="0">
-            <a:schemeClr val="accent1"/>
-          </a:effectRef>
-          <a:fontRef idx="minor">
-            <a:schemeClr val="lt1"/>
-          </a:fontRef>
-        </p:style>
-        <p:txBody>
-          <a:bodyPr rot="0" spcFirstLastPara="0" vertOverflow="overflow" horzOverflow="overflow" vert="horz" wrap="square" lIns="91440" tIns="45720" rIns="91440" bIns="45720" numCol="1" spcCol="0" rtlCol="0" fromWordArt="0" anchor="ctr" anchorCtr="0" forceAA="0" compatLnSpc="1">
-            <a:prstTxWarp prst="textNoShape">
-              <a:avLst/>
-            </a:prstTxWarp>
-            <a:noAutofit/>
-          </a:bodyPr>
-          <a:lstStyle/>
-          <a:p>
-            <a:pPr algn="ctr"/>
-            <a:endParaRPr lang="en-US"/>
-          </a:p>
-        </p:txBody>
-      </p:sp>
-      <p:sp>
-        <p:nvSpPr>
-          <p:cNvPr id="38" name="Cross 37">
-            <a:extLst>
-              <a:ext uri="{FF2B5EF4-FFF2-40B4-BE49-F238E27FC236}">
-                <a16:creationId xmlns:a16="http://schemas.microsoft.com/office/drawing/2014/main" id="{47D96CEB-804C-2E46-A728-F9C1D97D2E6E}"/>
-              </a:ext>
-            </a:extLst>
-          </p:cNvPr>
-          <p:cNvSpPr/>
-          <p:nvPr/>
-        </p:nvSpPr>
-        <p:spPr>
-          <a:xfrm>
-            <a:off x="1598219" y="681068"/>
-            <a:ext cx="94343" cy="94343"/>
-          </a:xfrm>
-          <a:prstGeom prst="plus">
-            <a:avLst>
-              <a:gd name="adj" fmla="val 41102"/>
-            </a:avLst>
-          </a:prstGeom>
-          <a:solidFill>
-            <a:schemeClr val="tx1"/>
-          </a:solidFill>
-          <a:ln>
-            <a:noFill/>
-          </a:ln>
-        </p:spPr>
-        <p:style>
-          <a:lnRef idx="2">
-            <a:schemeClr val="accent1">
-              <a:shade val="50000"/>
-            </a:schemeClr>
-          </a:lnRef>
-          <a:fillRef idx="1">
-            <a:schemeClr val="accent1"/>
-          </a:fillRef>
-          <a:effectRef idx="0">
-            <a:schemeClr val="accent1"/>
-          </a:effectRef>
-          <a:fontRef idx="minor">
-            <a:schemeClr val="lt1"/>
-          </a:fontRef>
-        </p:style>
-        <p:txBody>
-          <a:bodyPr rot="0" spcFirstLastPara="0" vertOverflow="overflow" horzOverflow="overflow" vert="horz" wrap="square" lIns="91440" tIns="45720" rIns="91440" bIns="45720" numCol="1" spcCol="0" rtlCol="0" fromWordArt="0" anchor="ctr" anchorCtr="0" forceAA="0" compatLnSpc="1">
-            <a:prstTxWarp prst="textNoShape">
-              <a:avLst/>
-            </a:prstTxWarp>
-            <a:noAutofit/>
-          </a:bodyPr>
-          <a:lstStyle/>
-          <a:p>
-            <a:pPr algn="ctr"/>
-            <a:endParaRPr lang="en-US"/>
-          </a:p>
-        </p:txBody>
-      </p:sp>
-      <p:sp>
-        <p:nvSpPr>
-          <p:cNvPr id="39" name="Cross 38">
-            <a:extLst>
-              <a:ext uri="{FF2B5EF4-FFF2-40B4-BE49-F238E27FC236}">
-                <a16:creationId xmlns:a16="http://schemas.microsoft.com/office/drawing/2014/main" id="{EF01BA1B-6F1F-8249-BB71-74476A60FABA}"/>
-              </a:ext>
-            </a:extLst>
-          </p:cNvPr>
-          <p:cNvSpPr/>
-          <p:nvPr/>
-        </p:nvSpPr>
-        <p:spPr>
-          <a:xfrm>
-            <a:off x="2120139" y="675753"/>
-            <a:ext cx="94343" cy="94343"/>
-          </a:xfrm>
-          <a:prstGeom prst="plus">
-            <a:avLst>
-              <a:gd name="adj" fmla="val 41102"/>
-            </a:avLst>
-          </a:prstGeom>
-          <a:solidFill>
-            <a:schemeClr val="tx1"/>
-          </a:solidFill>
-          <a:ln>
-            <a:noFill/>
-          </a:ln>
-        </p:spPr>
-        <p:style>
-          <a:lnRef idx="2">
-            <a:schemeClr val="accent1">
-              <a:shade val="50000"/>
-            </a:schemeClr>
-          </a:lnRef>
-          <a:fillRef idx="1">
-            <a:schemeClr val="accent1"/>
-          </a:fillRef>
-          <a:effectRef idx="0">
-            <a:schemeClr val="accent1"/>
-          </a:effectRef>
-          <a:fontRef idx="minor">
-            <a:schemeClr val="lt1"/>
-          </a:fontRef>
-        </p:style>
-        <p:txBody>
-          <a:bodyPr rot="0" spcFirstLastPara="0" vertOverflow="overflow" horzOverflow="overflow" vert="horz" wrap="square" lIns="91440" tIns="45720" rIns="91440" bIns="45720" numCol="1" spcCol="0" rtlCol="0" fromWordArt="0" anchor="ctr" anchorCtr="0" forceAA="0" compatLnSpc="1">
-            <a:prstTxWarp prst="textNoShape">
-              <a:avLst/>
-            </a:prstTxWarp>
-            <a:noAutofit/>
-          </a:bodyPr>
-          <a:lstStyle/>
-          <a:p>
-            <a:pPr algn="ctr"/>
-            <a:endParaRPr lang="en-US"/>
-          </a:p>
-        </p:txBody>
-      </p:sp>
-      <p:sp>
-        <p:nvSpPr>
-          <p:cNvPr id="40" name="Double Bracket 39">
-            <a:extLst>
-              <a:ext uri="{FF2B5EF4-FFF2-40B4-BE49-F238E27FC236}">
-                <a16:creationId xmlns:a16="http://schemas.microsoft.com/office/drawing/2014/main" id="{BC9E3D07-C632-9443-A5B4-B99C285BB8AE}"/>
-              </a:ext>
-            </a:extLst>
-          </p:cNvPr>
-          <p:cNvSpPr/>
-          <p:nvPr/>
-        </p:nvSpPr>
-        <p:spPr>
-          <a:xfrm>
-            <a:off x="177143" y="506299"/>
-            <a:ext cx="2411014" cy="449739"/>
-          </a:xfrm>
-          <a:prstGeom prst="bracketPair">
-            <a:avLst>
-              <a:gd name="adj" fmla="val 6985"/>
-            </a:avLst>
-          </a:prstGeom>
-          <a:ln w="19050">
-            <a:solidFill>
-              <a:schemeClr val="tx1"/>
-            </a:solidFill>
-          </a:ln>
-        </p:spPr>
-        <p:style>
-          <a:lnRef idx="1">
-            <a:schemeClr val="accent1"/>
-          </a:lnRef>
-          <a:fillRef idx="0">
-            <a:schemeClr val="accent1"/>
-          </a:fillRef>
-          <a:effectRef idx="0">
-            <a:schemeClr val="accent1"/>
-          </a:effectRef>
-          <a:fontRef idx="minor">
-            <a:schemeClr val="tx1"/>
-          </a:fontRef>
-        </p:style>
-        <p:txBody>
-          <a:bodyPr rot="0" spcFirstLastPara="0" vertOverflow="overflow" horzOverflow="overflow" vert="horz" wrap="square" lIns="91440" tIns="45720" rIns="91440" bIns="45720" numCol="1" spcCol="0" rtlCol="0" fromWordArt="0" anchor="ctr" anchorCtr="0" forceAA="0" compatLnSpc="1">
-            <a:prstTxWarp prst="textNoShape">
-              <a:avLst/>
-            </a:prstTxWarp>
-            <a:noAutofit/>
-          </a:bodyPr>
-          <a:lstStyle/>
-          <a:p>
-            <a:pPr algn="ctr"/>
-            <a:endParaRPr lang="en-US"/>
-          </a:p>
-        </p:txBody>
-      </p:sp>
-      <p:sp>
-        <p:nvSpPr>
-          <p:cNvPr id="41" name="Rectangle 40">
-            <a:extLst>
-              <a:ext uri="{FF2B5EF4-FFF2-40B4-BE49-F238E27FC236}">
-                <a16:creationId xmlns:a16="http://schemas.microsoft.com/office/drawing/2014/main" id="{ABF7579F-0A05-2043-8DB9-18BA94B73970}"/>
-              </a:ext>
-            </a:extLst>
-          </p:cNvPr>
-          <p:cNvSpPr/>
-          <p:nvPr/>
-        </p:nvSpPr>
-        <p:spPr>
-          <a:xfrm>
-            <a:off x="2578200" y="592668"/>
-            <a:ext cx="370614" cy="276999"/>
-          </a:xfrm>
-          <a:prstGeom prst="rect">
-            <a:avLst/>
-          </a:prstGeom>
-        </p:spPr>
-        <p:txBody>
-          <a:bodyPr wrap="none">
-            <a:spAutoFit/>
-          </a:bodyPr>
-          <a:lstStyle/>
-          <a:p>
-            <a:r>
-              <a:rPr lang="en-US" sz="1200" dirty="0">
-                <a:latin typeface="Avenir Next" panose="020B0503020202020204" pitchFamily="34" charset="0"/>
-                <a:ea typeface="Helvetica Neue" panose="02000503000000020004" pitchFamily="2" charset="0"/>
-                <a:cs typeface="Helvetica Neue" panose="02000503000000020004" pitchFamily="2" charset="0"/>
-              </a:rPr>
-              <a:t>/ 5</a:t>
-            </a:r>
-            <a:endParaRPr lang="en-US" sz="1200" dirty="0"/>
-          </a:p>
-        </p:txBody>
-      </p:sp>
-      <p:cxnSp>
-        <p:nvCxnSpPr>
-          <p:cNvPr id="42" name="Straight Arrow Connector 41">
-            <a:extLst>
-              <a:ext uri="{FF2B5EF4-FFF2-40B4-BE49-F238E27FC236}">
-                <a16:creationId xmlns:a16="http://schemas.microsoft.com/office/drawing/2014/main" id="{BEEA5D0A-635F-5942-9F45-16C52D95F148}"/>
-              </a:ext>
-            </a:extLst>
-          </p:cNvPr>
-          <p:cNvCxnSpPr/>
-          <p:nvPr/>
-        </p:nvCxnSpPr>
-        <p:spPr>
-          <a:xfrm>
-            <a:off x="2948830" y="722908"/>
-            <a:ext cx="303003" cy="0"/>
-          </a:xfrm>
-          <a:prstGeom prst="straightConnector1">
-            <a:avLst/>
-          </a:prstGeom>
-          <a:ln w="31750">
-            <a:solidFill>
-              <a:schemeClr val="tx1"/>
-            </a:solidFill>
-            <a:tailEnd type="triangle"/>
-          </a:ln>
-        </p:spPr>
-        <p:style>
-          <a:lnRef idx="1">
-            <a:schemeClr val="accent1"/>
-          </a:lnRef>
-          <a:fillRef idx="0">
-            <a:schemeClr val="accent1"/>
-          </a:fillRef>
-          <a:effectRef idx="0">
-            <a:schemeClr val="accent1"/>
-          </a:effectRef>
-          <a:fontRef idx="minor">
-            <a:schemeClr val="tx1"/>
-          </a:fontRef>
-        </p:style>
-      </p:cxnSp>
-      <p:graphicFrame>
-        <p:nvGraphicFramePr>
-          <p:cNvPr id="43" name="Table 42">
-            <a:extLst>
-              <a:ext uri="{FF2B5EF4-FFF2-40B4-BE49-F238E27FC236}">
-                <a16:creationId xmlns:a16="http://schemas.microsoft.com/office/drawing/2014/main" id="{33006E08-EC01-1C47-8C15-CF1CF88A2AA8}"/>
-              </a:ext>
-            </a:extLst>
-          </p:cNvPr>
-          <p:cNvGraphicFramePr>
-            <a:graphicFrameLocks noGrp="1"/>
-          </p:cNvGraphicFramePr>
-          <p:nvPr>
-            <p:extLst>
-              <p:ext uri="{D42A27DB-BD31-4B8C-83A1-F6EECF244321}">
-                <p14:modId xmlns:p14="http://schemas.microsoft.com/office/powerpoint/2010/main" val="532475408"/>
-              </p:ext>
-            </p:extLst>
-          </p:nvPr>
-        </p:nvGraphicFramePr>
-        <p:xfrm>
-          <a:off x="3448338" y="538949"/>
-          <a:ext cx="125002" cy="384435"/>
-        </p:xfrm>
-        <a:graphic>
-          <a:graphicData uri="http://schemas.openxmlformats.org/drawingml/2006/table">
-            <a:tbl>
-              <a:tblPr firstRow="1" bandRow="1">
-                <a:tableStyleId>{5940675A-B579-460E-94D1-54222C63F5DA}</a:tableStyleId>
-              </a:tblPr>
-              <a:tblGrid>
-                <a:gridCol w="125002">
-                  <a:extLst>
-                    <a:ext uri="{9D8B030D-6E8A-4147-A177-3AD203B41FA5}">
-                      <a16:colId xmlns:a16="http://schemas.microsoft.com/office/drawing/2014/main" val="20000"/>
-                    </a:ext>
-                  </a:extLst>
-                </a:gridCol>
-              </a:tblGrid>
-              <a:tr h="128145">
-                <a:tc>
-                  <a:txBody>
-                    <a:bodyPr/>
-                    <a:lstStyle/>
-                    <a:p>
-                      <a:pPr algn="ctr"/>
-                      <a:endParaRPr lang="en-US" sz="500" dirty="0"/>
-                    </a:p>
-                  </a:txBody>
-                  <a:tcPr marL="25604" marR="25604" marT="12802" marB="12802" anchor="ctr">
-                    <a:solidFill>
-                      <a:srgbClr val="00B050">
-                        <a:alpha val="30000"/>
-                      </a:srgbClr>
-                    </a:solidFill>
-                  </a:tcPr>
-                </a:tc>
-                <a:extLst>
-                  <a:ext uri="{0D108BD9-81ED-4DB2-BD59-A6C34878D82A}">
-                    <a16:rowId xmlns:a16="http://schemas.microsoft.com/office/drawing/2014/main" val="3355847617"/>
-                  </a:ext>
-                </a:extLst>
-              </a:tr>
-              <a:tr h="128145">
-                <a:tc>
-                  <a:txBody>
-                    <a:bodyPr/>
-                    <a:lstStyle/>
-                    <a:p>
-                      <a:pPr algn="ctr"/>
-                      <a:endParaRPr lang="en-US" sz="500" dirty="0"/>
-                    </a:p>
-                  </a:txBody>
-                  <a:tcPr marL="25604" marR="25604" marT="12802" marB="12802" anchor="ctr">
-                    <a:solidFill>
-                      <a:srgbClr val="00B050">
-                        <a:alpha val="30000"/>
-                      </a:srgbClr>
-                    </a:solidFill>
-                  </a:tcPr>
-                </a:tc>
-                <a:extLst>
-                  <a:ext uri="{0D108BD9-81ED-4DB2-BD59-A6C34878D82A}">
-                    <a16:rowId xmlns:a16="http://schemas.microsoft.com/office/drawing/2014/main" val="916629886"/>
-                  </a:ext>
-                </a:extLst>
-              </a:tr>
-              <a:tr h="128145">
-                <a:tc>
-                  <a:txBody>
-                    <a:bodyPr/>
-                    <a:lstStyle/>
-                    <a:p>
-                      <a:pPr algn="ctr"/>
-                      <a:endParaRPr lang="en-US" sz="500" dirty="0"/>
-                    </a:p>
-                  </a:txBody>
-                  <a:tcPr marL="25604" marR="25604" marT="12802" marB="12802" anchor="ctr">
-                    <a:solidFill>
-                      <a:srgbClr val="00B050">
-                        <a:alpha val="30000"/>
-                      </a:srgbClr>
-                    </a:solidFill>
-                  </a:tcPr>
-                </a:tc>
-                <a:extLst>
-                  <a:ext uri="{0D108BD9-81ED-4DB2-BD59-A6C34878D82A}">
-                    <a16:rowId xmlns:a16="http://schemas.microsoft.com/office/drawing/2014/main" val="893773089"/>
-                  </a:ext>
-                </a:extLst>
-              </a:tr>
-            </a:tbl>
-          </a:graphicData>
-        </a:graphic>
-      </p:graphicFrame>
       <p:sp>
         <p:nvSpPr>
           <p:cNvPr id="44" name="TextBox 43">
@@ -4158,7 +3254,7 @@
         </p:nvSpPr>
         <p:spPr>
           <a:xfrm>
-            <a:off x="2856099" y="76983"/>
+            <a:off x="2856099" y="73632"/>
             <a:ext cx="1303976" cy="461665"/>
           </a:xfrm>
           <a:prstGeom prst="rect">
@@ -4218,49 +3314,6 @@
               </a:solidFill>
               <a:latin typeface="Avenir Next" panose="020B0503020202020204" pitchFamily="34" charset="0"/>
             </a:endParaRPr>
-          </a:p>
-        </p:txBody>
-      </p:sp>
-      <p:sp>
-        <p:nvSpPr>
-          <p:cNvPr id="45" name="TextBox 44">
-            <a:extLst>
-              <a:ext uri="{FF2B5EF4-FFF2-40B4-BE49-F238E27FC236}">
-                <a16:creationId xmlns:a16="http://schemas.microsoft.com/office/drawing/2014/main" id="{7CEB8DA1-0613-F248-AD3E-311D94E43EBD}"/>
-              </a:ext>
-            </a:extLst>
-          </p:cNvPr>
-          <p:cNvSpPr txBox="1"/>
-          <p:nvPr/>
-        </p:nvSpPr>
-        <p:spPr>
-          <a:xfrm>
-            <a:off x="374183" y="222029"/>
-            <a:ext cx="2013828" cy="276999"/>
-          </a:xfrm>
-          <a:prstGeom prst="rect">
-            <a:avLst/>
-          </a:prstGeom>
-          <a:noFill/>
-        </p:spPr>
-        <p:txBody>
-          <a:bodyPr wrap="square" rtlCol="0">
-            <a:spAutoFit/>
-          </a:bodyPr>
-          <a:lstStyle/>
-          <a:p>
-            <a:pPr algn="ctr"/>
-            <a:r>
-              <a:rPr lang="en-US" sz="1200" dirty="0">
-                <a:solidFill>
-                  <a:schemeClr val="bg2">
-                    <a:lumMod val="50000"/>
-                  </a:schemeClr>
-                </a:solidFill>
-                <a:latin typeface="Avenir Next" panose="020B0503020202020204" pitchFamily="34" charset="0"/>
-              </a:rPr>
-              <a:t>word2vec vectors</a:t>
-            </a:r>
           </a:p>
         </p:txBody>
       </p:sp>
@@ -4279,13 +3332,13 @@
           <p:nvPr>
             <p:extLst>
               <p:ext uri="{D42A27DB-BD31-4B8C-83A1-F6EECF244321}">
-                <p14:modId xmlns:p14="http://schemas.microsoft.com/office/powerpoint/2010/main" val="2983523118"/>
+                <p14:modId xmlns:p14="http://schemas.microsoft.com/office/powerpoint/2010/main" val="3407178278"/>
               </p:ext>
             </p:extLst>
           </p:nvPr>
         </p:nvGraphicFramePr>
         <p:xfrm>
-          <a:off x="4049497" y="338473"/>
+          <a:off x="4049497" y="335120"/>
           <a:ext cx="125002" cy="768870"/>
         </p:xfrm>
         <a:graphic>
@@ -4465,7 +3518,7 @@
         </p:nvCxnSpPr>
         <p:spPr>
           <a:xfrm>
-            <a:off x="3667287" y="735921"/>
+            <a:off x="3667289" y="732568"/>
             <a:ext cx="303003" cy="0"/>
           </a:xfrm>
           <a:prstGeom prst="straightConnector1">
@@ -4507,7 +3560,7 @@
         </p:nvCxnSpPr>
         <p:spPr>
           <a:xfrm>
-            <a:off x="4239411" y="718709"/>
+            <a:off x="4239413" y="715356"/>
             <a:ext cx="303003" cy="0"/>
           </a:xfrm>
           <a:prstGeom prst="straightConnector1">
@@ -4557,7 +3610,7 @@
         </p:blipFill>
         <p:spPr>
           <a:xfrm>
-            <a:off x="4529508" y="360524"/>
+            <a:off x="4529508" y="357171"/>
             <a:ext cx="736600" cy="736600"/>
           </a:xfrm>
           <a:prstGeom prst="rect">
@@ -4579,7 +3632,7 @@
         </p:nvSpPr>
         <p:spPr>
           <a:xfrm>
-            <a:off x="4533434" y="1008200"/>
+            <a:off x="4533434" y="1004847"/>
             <a:ext cx="732674" cy="400110"/>
           </a:xfrm>
           <a:prstGeom prst="rect">
@@ -4647,7 +3700,7 @@
         </p:nvCxnSpPr>
         <p:spPr>
           <a:xfrm>
-            <a:off x="5266124" y="718709"/>
+            <a:off x="5266126" y="715356"/>
             <a:ext cx="303003" cy="0"/>
           </a:xfrm>
           <a:prstGeom prst="straightConnector1">
@@ -4690,13 +3743,13 @@
           <p:nvPr>
             <p:extLst>
               <p:ext uri="{D42A27DB-BD31-4B8C-83A1-F6EECF244321}">
-                <p14:modId xmlns:p14="http://schemas.microsoft.com/office/powerpoint/2010/main" val="3457835571"/>
+                <p14:modId xmlns:p14="http://schemas.microsoft.com/office/powerpoint/2010/main" val="4089843711"/>
               </p:ext>
             </p:extLst>
           </p:nvPr>
         </p:nvGraphicFramePr>
         <p:xfrm>
-          <a:off x="5662326" y="231974"/>
+          <a:off x="5662326" y="228621"/>
           <a:ext cx="158266" cy="973470"/>
         </p:xfrm>
         <a:graphic>
@@ -4882,7 +3935,7 @@
         </p:nvSpPr>
         <p:spPr>
           <a:xfrm>
-            <a:off x="5839007" y="191300"/>
+            <a:off x="5839009" y="187949"/>
             <a:ext cx="445955" cy="246221"/>
           </a:xfrm>
           <a:prstGeom prst="rect">
@@ -4937,7 +3990,7 @@
         </p:nvSpPr>
         <p:spPr>
           <a:xfrm>
-            <a:off x="5848054" y="346017"/>
+            <a:off x="5848056" y="342666"/>
             <a:ext cx="830677" cy="246221"/>
           </a:xfrm>
           <a:prstGeom prst="rect">
@@ -4986,7 +4039,7 @@
         </p:nvSpPr>
         <p:spPr>
           <a:xfrm>
-            <a:off x="5838185" y="514512"/>
+            <a:off x="5838185" y="511161"/>
             <a:ext cx="663964" cy="246221"/>
           </a:xfrm>
           <a:prstGeom prst="rect">
@@ -5041,7 +4094,7 @@
         </p:nvSpPr>
         <p:spPr>
           <a:xfrm>
-            <a:off x="5851939" y="667712"/>
+            <a:off x="5851939" y="664361"/>
             <a:ext cx="378630" cy="246221"/>
           </a:xfrm>
           <a:prstGeom prst="rect">
@@ -5085,7 +4138,7 @@
         </p:nvSpPr>
         <p:spPr>
           <a:xfrm>
-            <a:off x="5851894" y="989407"/>
+            <a:off x="5851894" y="986056"/>
             <a:ext cx="364202" cy="246221"/>
           </a:xfrm>
           <a:prstGeom prst="rect">
@@ -5129,7 +4182,7 @@
         </p:nvSpPr>
         <p:spPr>
           <a:xfrm>
-            <a:off x="5857261" y="806956"/>
+            <a:off x="5857261" y="803605"/>
             <a:ext cx="312906" cy="246221"/>
           </a:xfrm>
           <a:prstGeom prst="rect">
@@ -5173,7 +4226,7 @@
         </p:nvSpPr>
         <p:spPr>
           <a:xfrm>
-            <a:off x="5428718" y="1225904"/>
+            <a:off x="5428720" y="1222551"/>
             <a:ext cx="625491" cy="253916"/>
           </a:xfrm>
           <a:prstGeom prst="rect">
@@ -5197,6 +4250,1344 @@
           </a:p>
         </p:txBody>
       </p:sp>
+      <p:graphicFrame>
+        <p:nvGraphicFramePr>
+          <p:cNvPr id="35" name="Table 34">
+            <a:extLst>
+              <a:ext uri="{FF2B5EF4-FFF2-40B4-BE49-F238E27FC236}">
+                <a16:creationId xmlns:a16="http://schemas.microsoft.com/office/drawing/2014/main" id="{F6B3DBC1-80EE-F742-8BEA-5B0AAAC32CA3}"/>
+              </a:ext>
+            </a:extLst>
+          </p:cNvPr>
+          <p:cNvGraphicFramePr>
+            <a:graphicFrameLocks noGrp="1"/>
+          </p:cNvGraphicFramePr>
+          <p:nvPr>
+            <p:extLst>
+              <p:ext uri="{D42A27DB-BD31-4B8C-83A1-F6EECF244321}">
+                <p14:modId xmlns:p14="http://schemas.microsoft.com/office/powerpoint/2010/main" val="3605494465"/>
+              </p:ext>
+            </p:extLst>
+          </p:nvPr>
+        </p:nvGraphicFramePr>
+        <p:xfrm>
+          <a:off x="313453" y="1032410"/>
+          <a:ext cx="125002" cy="384435"/>
+        </p:xfrm>
+        <a:graphic>
+          <a:graphicData uri="http://schemas.openxmlformats.org/drawingml/2006/table">
+            <a:tbl>
+              <a:tblPr firstRow="1" bandRow="1">
+                <a:tableStyleId>{5940675A-B579-460E-94D1-54222C63F5DA}</a:tableStyleId>
+              </a:tblPr>
+              <a:tblGrid>
+                <a:gridCol w="125002">
+                  <a:extLst>
+                    <a:ext uri="{9D8B030D-6E8A-4147-A177-3AD203B41FA5}">
+                      <a16:colId xmlns:a16="http://schemas.microsoft.com/office/drawing/2014/main" val="20000"/>
+                    </a:ext>
+                  </a:extLst>
+                </a:gridCol>
+              </a:tblGrid>
+              <a:tr h="128145">
+                <a:tc>
+                  <a:txBody>
+                    <a:bodyPr/>
+                    <a:lstStyle/>
+                    <a:p>
+                      <a:pPr algn="ctr"/>
+                      <a:endParaRPr lang="en-US" sz="500" dirty="0"/>
+                    </a:p>
+                  </a:txBody>
+                  <a:tcPr marL="25604" marR="25604" marT="12802" marB="12802" anchor="ctr">
+                    <a:solidFill>
+                      <a:srgbClr val="00B050">
+                        <a:alpha val="30000"/>
+                      </a:srgbClr>
+                    </a:solidFill>
+                  </a:tcPr>
+                </a:tc>
+                <a:extLst>
+                  <a:ext uri="{0D108BD9-81ED-4DB2-BD59-A6C34878D82A}">
+                    <a16:rowId xmlns:a16="http://schemas.microsoft.com/office/drawing/2014/main" val="3355847617"/>
+                  </a:ext>
+                </a:extLst>
+              </a:tr>
+              <a:tr h="128145">
+                <a:tc>
+                  <a:txBody>
+                    <a:bodyPr/>
+                    <a:lstStyle/>
+                    <a:p>
+                      <a:pPr algn="ctr"/>
+                      <a:endParaRPr lang="en-US" sz="500" dirty="0"/>
+                    </a:p>
+                  </a:txBody>
+                  <a:tcPr marL="25604" marR="25604" marT="12802" marB="12802" anchor="ctr">
+                    <a:solidFill>
+                      <a:srgbClr val="00B050">
+                        <a:alpha val="30000"/>
+                      </a:srgbClr>
+                    </a:solidFill>
+                  </a:tcPr>
+                </a:tc>
+                <a:extLst>
+                  <a:ext uri="{0D108BD9-81ED-4DB2-BD59-A6C34878D82A}">
+                    <a16:rowId xmlns:a16="http://schemas.microsoft.com/office/drawing/2014/main" val="916629886"/>
+                  </a:ext>
+                </a:extLst>
+              </a:tr>
+              <a:tr h="128145">
+                <a:tc>
+                  <a:txBody>
+                    <a:bodyPr/>
+                    <a:lstStyle/>
+                    <a:p>
+                      <a:pPr algn="ctr"/>
+                      <a:endParaRPr lang="en-US" sz="500" dirty="0"/>
+                    </a:p>
+                  </a:txBody>
+                  <a:tcPr marL="25604" marR="25604" marT="12802" marB="12802" anchor="ctr">
+                    <a:solidFill>
+                      <a:srgbClr val="00B050">
+                        <a:alpha val="30000"/>
+                      </a:srgbClr>
+                    </a:solidFill>
+                  </a:tcPr>
+                </a:tc>
+                <a:extLst>
+                  <a:ext uri="{0D108BD9-81ED-4DB2-BD59-A6C34878D82A}">
+                    <a16:rowId xmlns:a16="http://schemas.microsoft.com/office/drawing/2014/main" val="893773089"/>
+                  </a:ext>
+                </a:extLst>
+              </a:tr>
+            </a:tbl>
+          </a:graphicData>
+        </a:graphic>
+      </p:graphicFrame>
+      <p:graphicFrame>
+        <p:nvGraphicFramePr>
+          <p:cNvPr id="46" name="Table 45">
+            <a:extLst>
+              <a:ext uri="{FF2B5EF4-FFF2-40B4-BE49-F238E27FC236}">
+                <a16:creationId xmlns:a16="http://schemas.microsoft.com/office/drawing/2014/main" id="{1007FD6B-5857-F242-997E-AFABA239A772}"/>
+              </a:ext>
+            </a:extLst>
+          </p:cNvPr>
+          <p:cNvGraphicFramePr>
+            <a:graphicFrameLocks noGrp="1"/>
+          </p:cNvGraphicFramePr>
+          <p:nvPr>
+            <p:extLst>
+              <p:ext uri="{D42A27DB-BD31-4B8C-83A1-F6EECF244321}">
+                <p14:modId xmlns:p14="http://schemas.microsoft.com/office/powerpoint/2010/main" val="3767109276"/>
+              </p:ext>
+            </p:extLst>
+          </p:nvPr>
+        </p:nvGraphicFramePr>
+        <p:xfrm>
+          <a:off x="835663" y="1032407"/>
+          <a:ext cx="125002" cy="384435"/>
+        </p:xfrm>
+        <a:graphic>
+          <a:graphicData uri="http://schemas.openxmlformats.org/drawingml/2006/table">
+            <a:tbl>
+              <a:tblPr firstRow="1" bandRow="1">
+                <a:tableStyleId>{5940675A-B579-460E-94D1-54222C63F5DA}</a:tableStyleId>
+              </a:tblPr>
+              <a:tblGrid>
+                <a:gridCol w="125002">
+                  <a:extLst>
+                    <a:ext uri="{9D8B030D-6E8A-4147-A177-3AD203B41FA5}">
+                      <a16:colId xmlns:a16="http://schemas.microsoft.com/office/drawing/2014/main" val="20000"/>
+                    </a:ext>
+                  </a:extLst>
+                </a:gridCol>
+              </a:tblGrid>
+              <a:tr h="128145">
+                <a:tc>
+                  <a:txBody>
+                    <a:bodyPr/>
+                    <a:lstStyle/>
+                    <a:p>
+                      <a:pPr algn="ctr"/>
+                      <a:endParaRPr lang="en-US" sz="500" dirty="0"/>
+                    </a:p>
+                  </a:txBody>
+                  <a:tcPr marL="25604" marR="25604" marT="12802" marB="12802" anchor="ctr">
+                    <a:solidFill>
+                      <a:srgbClr val="00B050">
+                        <a:alpha val="30000"/>
+                      </a:srgbClr>
+                    </a:solidFill>
+                  </a:tcPr>
+                </a:tc>
+                <a:extLst>
+                  <a:ext uri="{0D108BD9-81ED-4DB2-BD59-A6C34878D82A}">
+                    <a16:rowId xmlns:a16="http://schemas.microsoft.com/office/drawing/2014/main" val="3355847617"/>
+                  </a:ext>
+                </a:extLst>
+              </a:tr>
+              <a:tr h="128145">
+                <a:tc>
+                  <a:txBody>
+                    <a:bodyPr/>
+                    <a:lstStyle/>
+                    <a:p>
+                      <a:pPr algn="ctr"/>
+                      <a:endParaRPr lang="en-US" sz="500" dirty="0"/>
+                    </a:p>
+                  </a:txBody>
+                  <a:tcPr marL="25604" marR="25604" marT="12802" marB="12802" anchor="ctr">
+                    <a:solidFill>
+                      <a:srgbClr val="00B050">
+                        <a:alpha val="30000"/>
+                      </a:srgbClr>
+                    </a:solidFill>
+                  </a:tcPr>
+                </a:tc>
+                <a:extLst>
+                  <a:ext uri="{0D108BD9-81ED-4DB2-BD59-A6C34878D82A}">
+                    <a16:rowId xmlns:a16="http://schemas.microsoft.com/office/drawing/2014/main" val="916629886"/>
+                  </a:ext>
+                </a:extLst>
+              </a:tr>
+              <a:tr h="128145">
+                <a:tc>
+                  <a:txBody>
+                    <a:bodyPr/>
+                    <a:lstStyle/>
+                    <a:p>
+                      <a:pPr algn="ctr"/>
+                      <a:endParaRPr lang="en-US" sz="500" dirty="0"/>
+                    </a:p>
+                  </a:txBody>
+                  <a:tcPr marL="25604" marR="25604" marT="12802" marB="12802" anchor="ctr">
+                    <a:solidFill>
+                      <a:srgbClr val="00B050">
+                        <a:alpha val="30000"/>
+                      </a:srgbClr>
+                    </a:solidFill>
+                  </a:tcPr>
+                </a:tc>
+                <a:extLst>
+                  <a:ext uri="{0D108BD9-81ED-4DB2-BD59-A6C34878D82A}">
+                    <a16:rowId xmlns:a16="http://schemas.microsoft.com/office/drawing/2014/main" val="893773089"/>
+                  </a:ext>
+                </a:extLst>
+              </a:tr>
+            </a:tbl>
+          </a:graphicData>
+        </a:graphic>
+      </p:graphicFrame>
+      <p:graphicFrame>
+        <p:nvGraphicFramePr>
+          <p:cNvPr id="49" name="Table 48">
+            <a:extLst>
+              <a:ext uri="{FF2B5EF4-FFF2-40B4-BE49-F238E27FC236}">
+                <a16:creationId xmlns:a16="http://schemas.microsoft.com/office/drawing/2014/main" id="{AB1275FA-FAD1-6342-8182-551A60746C82}"/>
+              </a:ext>
+            </a:extLst>
+          </p:cNvPr>
+          <p:cNvGraphicFramePr>
+            <a:graphicFrameLocks noGrp="1"/>
+          </p:cNvGraphicFramePr>
+          <p:nvPr>
+            <p:extLst>
+              <p:ext uri="{D42A27DB-BD31-4B8C-83A1-F6EECF244321}">
+                <p14:modId xmlns:p14="http://schemas.microsoft.com/office/powerpoint/2010/main" val="2875435794"/>
+              </p:ext>
+            </p:extLst>
+          </p:nvPr>
+        </p:nvGraphicFramePr>
+        <p:xfrm>
+          <a:off x="1352569" y="1035335"/>
+          <a:ext cx="125002" cy="384435"/>
+        </p:xfrm>
+        <a:graphic>
+          <a:graphicData uri="http://schemas.openxmlformats.org/drawingml/2006/table">
+            <a:tbl>
+              <a:tblPr firstRow="1" bandRow="1">
+                <a:tableStyleId>{5940675A-B579-460E-94D1-54222C63F5DA}</a:tableStyleId>
+              </a:tblPr>
+              <a:tblGrid>
+                <a:gridCol w="125002">
+                  <a:extLst>
+                    <a:ext uri="{9D8B030D-6E8A-4147-A177-3AD203B41FA5}">
+                      <a16:colId xmlns:a16="http://schemas.microsoft.com/office/drawing/2014/main" val="20000"/>
+                    </a:ext>
+                  </a:extLst>
+                </a:gridCol>
+              </a:tblGrid>
+              <a:tr h="128145">
+                <a:tc>
+                  <a:txBody>
+                    <a:bodyPr/>
+                    <a:lstStyle/>
+                    <a:p>
+                      <a:pPr algn="ctr"/>
+                      <a:endParaRPr lang="en-US" sz="500" dirty="0"/>
+                    </a:p>
+                  </a:txBody>
+                  <a:tcPr marL="25604" marR="25604" marT="12802" marB="12802" anchor="ctr">
+                    <a:solidFill>
+                      <a:srgbClr val="00B050">
+                        <a:alpha val="30000"/>
+                      </a:srgbClr>
+                    </a:solidFill>
+                  </a:tcPr>
+                </a:tc>
+                <a:extLst>
+                  <a:ext uri="{0D108BD9-81ED-4DB2-BD59-A6C34878D82A}">
+                    <a16:rowId xmlns:a16="http://schemas.microsoft.com/office/drawing/2014/main" val="3355847617"/>
+                  </a:ext>
+                </a:extLst>
+              </a:tr>
+              <a:tr h="128145">
+                <a:tc>
+                  <a:txBody>
+                    <a:bodyPr/>
+                    <a:lstStyle/>
+                    <a:p>
+                      <a:pPr algn="ctr"/>
+                      <a:endParaRPr lang="en-US" sz="500" dirty="0"/>
+                    </a:p>
+                  </a:txBody>
+                  <a:tcPr marL="25604" marR="25604" marT="12802" marB="12802" anchor="ctr">
+                    <a:solidFill>
+                      <a:srgbClr val="00B050">
+                        <a:alpha val="30000"/>
+                      </a:srgbClr>
+                    </a:solidFill>
+                  </a:tcPr>
+                </a:tc>
+                <a:extLst>
+                  <a:ext uri="{0D108BD9-81ED-4DB2-BD59-A6C34878D82A}">
+                    <a16:rowId xmlns:a16="http://schemas.microsoft.com/office/drawing/2014/main" val="916629886"/>
+                  </a:ext>
+                </a:extLst>
+              </a:tr>
+              <a:tr h="128145">
+                <a:tc>
+                  <a:txBody>
+                    <a:bodyPr/>
+                    <a:lstStyle/>
+                    <a:p>
+                      <a:pPr algn="ctr"/>
+                      <a:endParaRPr lang="en-US" sz="500" dirty="0"/>
+                    </a:p>
+                  </a:txBody>
+                  <a:tcPr marL="25604" marR="25604" marT="12802" marB="12802" anchor="ctr">
+                    <a:solidFill>
+                      <a:srgbClr val="00B050">
+                        <a:alpha val="30000"/>
+                      </a:srgbClr>
+                    </a:solidFill>
+                  </a:tcPr>
+                </a:tc>
+                <a:extLst>
+                  <a:ext uri="{0D108BD9-81ED-4DB2-BD59-A6C34878D82A}">
+                    <a16:rowId xmlns:a16="http://schemas.microsoft.com/office/drawing/2014/main" val="893773089"/>
+                  </a:ext>
+                </a:extLst>
+              </a:tr>
+            </a:tbl>
+          </a:graphicData>
+        </a:graphic>
+      </p:graphicFrame>
+      <p:graphicFrame>
+        <p:nvGraphicFramePr>
+          <p:cNvPr id="50" name="Table 49">
+            <a:extLst>
+              <a:ext uri="{FF2B5EF4-FFF2-40B4-BE49-F238E27FC236}">
+                <a16:creationId xmlns:a16="http://schemas.microsoft.com/office/drawing/2014/main" id="{D05193A5-2AC1-3C49-9622-D1D787A51831}"/>
+              </a:ext>
+            </a:extLst>
+          </p:cNvPr>
+          <p:cNvGraphicFramePr>
+            <a:graphicFrameLocks noGrp="1"/>
+          </p:cNvGraphicFramePr>
+          <p:nvPr>
+            <p:extLst>
+              <p:ext uri="{D42A27DB-BD31-4B8C-83A1-F6EECF244321}">
+                <p14:modId xmlns:p14="http://schemas.microsoft.com/office/powerpoint/2010/main" val="3410617040"/>
+              </p:ext>
+            </p:extLst>
+          </p:nvPr>
+        </p:nvGraphicFramePr>
+        <p:xfrm>
+          <a:off x="1874779" y="1032407"/>
+          <a:ext cx="125002" cy="384435"/>
+        </p:xfrm>
+        <a:graphic>
+          <a:graphicData uri="http://schemas.openxmlformats.org/drawingml/2006/table">
+            <a:tbl>
+              <a:tblPr firstRow="1" bandRow="1">
+                <a:tableStyleId>{5940675A-B579-460E-94D1-54222C63F5DA}</a:tableStyleId>
+              </a:tblPr>
+              <a:tblGrid>
+                <a:gridCol w="125002">
+                  <a:extLst>
+                    <a:ext uri="{9D8B030D-6E8A-4147-A177-3AD203B41FA5}">
+                      <a16:colId xmlns:a16="http://schemas.microsoft.com/office/drawing/2014/main" val="20000"/>
+                    </a:ext>
+                  </a:extLst>
+                </a:gridCol>
+              </a:tblGrid>
+              <a:tr h="128145">
+                <a:tc>
+                  <a:txBody>
+                    <a:bodyPr/>
+                    <a:lstStyle/>
+                    <a:p>
+                      <a:pPr algn="ctr"/>
+                      <a:endParaRPr lang="en-US" sz="500" dirty="0"/>
+                    </a:p>
+                  </a:txBody>
+                  <a:tcPr marL="25604" marR="25604" marT="12802" marB="12802" anchor="ctr">
+                    <a:solidFill>
+                      <a:srgbClr val="00B050">
+                        <a:alpha val="30000"/>
+                      </a:srgbClr>
+                    </a:solidFill>
+                  </a:tcPr>
+                </a:tc>
+                <a:extLst>
+                  <a:ext uri="{0D108BD9-81ED-4DB2-BD59-A6C34878D82A}">
+                    <a16:rowId xmlns:a16="http://schemas.microsoft.com/office/drawing/2014/main" val="3355847617"/>
+                  </a:ext>
+                </a:extLst>
+              </a:tr>
+              <a:tr h="128145">
+                <a:tc>
+                  <a:txBody>
+                    <a:bodyPr/>
+                    <a:lstStyle/>
+                    <a:p>
+                      <a:pPr algn="ctr"/>
+                      <a:endParaRPr lang="en-US" sz="500" dirty="0"/>
+                    </a:p>
+                  </a:txBody>
+                  <a:tcPr marL="25604" marR="25604" marT="12802" marB="12802" anchor="ctr">
+                    <a:solidFill>
+                      <a:srgbClr val="00B050">
+                        <a:alpha val="30000"/>
+                      </a:srgbClr>
+                    </a:solidFill>
+                  </a:tcPr>
+                </a:tc>
+                <a:extLst>
+                  <a:ext uri="{0D108BD9-81ED-4DB2-BD59-A6C34878D82A}">
+                    <a16:rowId xmlns:a16="http://schemas.microsoft.com/office/drawing/2014/main" val="916629886"/>
+                  </a:ext>
+                </a:extLst>
+              </a:tr>
+              <a:tr h="128145">
+                <a:tc>
+                  <a:txBody>
+                    <a:bodyPr/>
+                    <a:lstStyle/>
+                    <a:p>
+                      <a:pPr algn="ctr"/>
+                      <a:endParaRPr lang="en-US" sz="500" dirty="0"/>
+                    </a:p>
+                  </a:txBody>
+                  <a:tcPr marL="25604" marR="25604" marT="12802" marB="12802" anchor="ctr">
+                    <a:solidFill>
+                      <a:srgbClr val="00B050">
+                        <a:alpha val="30000"/>
+                      </a:srgbClr>
+                    </a:solidFill>
+                  </a:tcPr>
+                </a:tc>
+                <a:extLst>
+                  <a:ext uri="{0D108BD9-81ED-4DB2-BD59-A6C34878D82A}">
+                    <a16:rowId xmlns:a16="http://schemas.microsoft.com/office/drawing/2014/main" val="893773089"/>
+                  </a:ext>
+                </a:extLst>
+              </a:tr>
+            </a:tbl>
+          </a:graphicData>
+        </a:graphic>
+      </p:graphicFrame>
+      <p:graphicFrame>
+        <p:nvGraphicFramePr>
+          <p:cNvPr id="51" name="Table 50">
+            <a:extLst>
+              <a:ext uri="{FF2B5EF4-FFF2-40B4-BE49-F238E27FC236}">
+                <a16:creationId xmlns:a16="http://schemas.microsoft.com/office/drawing/2014/main" id="{F2BC239B-D0DE-7A4C-AA46-612B13768011}"/>
+              </a:ext>
+            </a:extLst>
+          </p:cNvPr>
+          <p:cNvGraphicFramePr>
+            <a:graphicFrameLocks noGrp="1"/>
+          </p:cNvGraphicFramePr>
+          <p:nvPr>
+            <p:extLst>
+              <p:ext uri="{D42A27DB-BD31-4B8C-83A1-F6EECF244321}">
+                <p14:modId xmlns:p14="http://schemas.microsoft.com/office/powerpoint/2010/main" val="351561545"/>
+              </p:ext>
+            </p:extLst>
+          </p:nvPr>
+        </p:nvGraphicFramePr>
+        <p:xfrm>
+          <a:off x="2390645" y="1032407"/>
+          <a:ext cx="125002" cy="384435"/>
+        </p:xfrm>
+        <a:graphic>
+          <a:graphicData uri="http://schemas.openxmlformats.org/drawingml/2006/table">
+            <a:tbl>
+              <a:tblPr firstRow="1" bandRow="1">
+                <a:tableStyleId>{5940675A-B579-460E-94D1-54222C63F5DA}</a:tableStyleId>
+              </a:tblPr>
+              <a:tblGrid>
+                <a:gridCol w="125002">
+                  <a:extLst>
+                    <a:ext uri="{9D8B030D-6E8A-4147-A177-3AD203B41FA5}">
+                      <a16:colId xmlns:a16="http://schemas.microsoft.com/office/drawing/2014/main" val="20000"/>
+                    </a:ext>
+                  </a:extLst>
+                </a:gridCol>
+              </a:tblGrid>
+              <a:tr h="128145">
+                <a:tc>
+                  <a:txBody>
+                    <a:bodyPr/>
+                    <a:lstStyle/>
+                    <a:p>
+                      <a:pPr algn="ctr"/>
+                      <a:endParaRPr lang="en-US" sz="500" dirty="0"/>
+                    </a:p>
+                  </a:txBody>
+                  <a:tcPr marL="25604" marR="25604" marT="12802" marB="12802" anchor="ctr">
+                    <a:solidFill>
+                      <a:srgbClr val="00B050">
+                        <a:alpha val="30000"/>
+                      </a:srgbClr>
+                    </a:solidFill>
+                  </a:tcPr>
+                </a:tc>
+                <a:extLst>
+                  <a:ext uri="{0D108BD9-81ED-4DB2-BD59-A6C34878D82A}">
+                    <a16:rowId xmlns:a16="http://schemas.microsoft.com/office/drawing/2014/main" val="3355847617"/>
+                  </a:ext>
+                </a:extLst>
+              </a:tr>
+              <a:tr h="128145">
+                <a:tc>
+                  <a:txBody>
+                    <a:bodyPr/>
+                    <a:lstStyle/>
+                    <a:p>
+                      <a:pPr algn="ctr"/>
+                      <a:endParaRPr lang="en-US" sz="500" dirty="0"/>
+                    </a:p>
+                  </a:txBody>
+                  <a:tcPr marL="25604" marR="25604" marT="12802" marB="12802" anchor="ctr">
+                    <a:solidFill>
+                      <a:srgbClr val="00B050">
+                        <a:alpha val="30000"/>
+                      </a:srgbClr>
+                    </a:solidFill>
+                  </a:tcPr>
+                </a:tc>
+                <a:extLst>
+                  <a:ext uri="{0D108BD9-81ED-4DB2-BD59-A6C34878D82A}">
+                    <a16:rowId xmlns:a16="http://schemas.microsoft.com/office/drawing/2014/main" val="916629886"/>
+                  </a:ext>
+                </a:extLst>
+              </a:tr>
+              <a:tr h="128145">
+                <a:tc>
+                  <a:txBody>
+                    <a:bodyPr/>
+                    <a:lstStyle/>
+                    <a:p>
+                      <a:pPr algn="ctr"/>
+                      <a:endParaRPr lang="en-US" sz="500" dirty="0"/>
+                    </a:p>
+                  </a:txBody>
+                  <a:tcPr marL="25604" marR="25604" marT="12802" marB="12802" anchor="ctr">
+                    <a:solidFill>
+                      <a:srgbClr val="00B050">
+                        <a:alpha val="30000"/>
+                      </a:srgbClr>
+                    </a:solidFill>
+                  </a:tcPr>
+                </a:tc>
+                <a:extLst>
+                  <a:ext uri="{0D108BD9-81ED-4DB2-BD59-A6C34878D82A}">
+                    <a16:rowId xmlns:a16="http://schemas.microsoft.com/office/drawing/2014/main" val="893773089"/>
+                  </a:ext>
+                </a:extLst>
+              </a:tr>
+            </a:tbl>
+          </a:graphicData>
+        </a:graphic>
+      </p:graphicFrame>
+      <p:sp>
+        <p:nvSpPr>
+          <p:cNvPr id="52" name="TextBox 51">
+            <a:extLst>
+              <a:ext uri="{FF2B5EF4-FFF2-40B4-BE49-F238E27FC236}">
+                <a16:creationId xmlns:a16="http://schemas.microsoft.com/office/drawing/2014/main" id="{6B024FCD-AF76-204E-870E-3744CE391516}"/>
+              </a:ext>
+            </a:extLst>
+          </p:cNvPr>
+          <p:cNvSpPr txBox="1"/>
+          <p:nvPr/>
+        </p:nvSpPr>
+        <p:spPr>
+          <a:xfrm>
+            <a:off x="413865" y="110458"/>
+            <a:ext cx="2013828" cy="461665"/>
+          </a:xfrm>
+          <a:prstGeom prst="rect">
+            <a:avLst/>
+          </a:prstGeom>
+          <a:noFill/>
+        </p:spPr>
+        <p:txBody>
+          <a:bodyPr wrap="square" rtlCol="0">
+            <a:spAutoFit/>
+          </a:bodyPr>
+          <a:lstStyle/>
+          <a:p>
+            <a:pPr algn="ctr"/>
+            <a:r>
+              <a:rPr lang="en-US" sz="1200" dirty="0">
+                <a:solidFill>
+                  <a:schemeClr val="bg2">
+                    <a:lumMod val="50000"/>
+                  </a:schemeClr>
+                </a:solidFill>
+                <a:latin typeface="Avenir Next" panose="020B0503020202020204" pitchFamily="34" charset="0"/>
+              </a:rPr>
+              <a:t>Recurrent model </a:t>
+            </a:r>
+          </a:p>
+          <a:p>
+            <a:pPr algn="ctr"/>
+            <a:r>
+              <a:rPr lang="en-US" sz="1200" dirty="0">
+                <a:solidFill>
+                  <a:schemeClr val="bg2">
+                    <a:lumMod val="50000"/>
+                  </a:schemeClr>
+                </a:solidFill>
+                <a:latin typeface="Avenir Next" panose="020B0503020202020204" pitchFamily="34" charset="0"/>
+              </a:rPr>
+              <a:t>e.g. LSTM</a:t>
+            </a:r>
+          </a:p>
+        </p:txBody>
+      </p:sp>
+      <p:sp>
+        <p:nvSpPr>
+          <p:cNvPr id="53" name="Rectangle 52">
+            <a:extLst>
+              <a:ext uri="{FF2B5EF4-FFF2-40B4-BE49-F238E27FC236}">
+                <a16:creationId xmlns:a16="http://schemas.microsoft.com/office/drawing/2014/main" id="{6086BB7F-E942-1F40-9079-AC6A4AB3450C}"/>
+              </a:ext>
+            </a:extLst>
+          </p:cNvPr>
+          <p:cNvSpPr/>
+          <p:nvPr/>
+        </p:nvSpPr>
+        <p:spPr>
+          <a:xfrm>
+            <a:off x="286546" y="631320"/>
+            <a:ext cx="178816" cy="178816"/>
+          </a:xfrm>
+          <a:prstGeom prst="rect">
+            <a:avLst/>
+          </a:prstGeom>
+          <a:solidFill>
+            <a:schemeClr val="accent1">
+              <a:lumMod val="20000"/>
+              <a:lumOff val="80000"/>
+            </a:schemeClr>
+          </a:solidFill>
+          <a:ln w="25400">
+            <a:solidFill>
+              <a:schemeClr val="tx1"/>
+            </a:solidFill>
+          </a:ln>
+        </p:spPr>
+        <p:style>
+          <a:lnRef idx="2">
+            <a:schemeClr val="accent1">
+              <a:shade val="50000"/>
+            </a:schemeClr>
+          </a:lnRef>
+          <a:fillRef idx="1">
+            <a:schemeClr val="accent1"/>
+          </a:fillRef>
+          <a:effectRef idx="0">
+            <a:schemeClr val="accent1"/>
+          </a:effectRef>
+          <a:fontRef idx="minor">
+            <a:schemeClr val="lt1"/>
+          </a:fontRef>
+        </p:style>
+        <p:txBody>
+          <a:bodyPr rot="0" spcFirstLastPara="0" vertOverflow="overflow" horzOverflow="overflow" vert="horz" wrap="square" lIns="91440" tIns="45720" rIns="91440" bIns="45720" numCol="1" spcCol="0" rtlCol="0" fromWordArt="0" anchor="ctr" anchorCtr="0" forceAA="0" compatLnSpc="1">
+            <a:prstTxWarp prst="textNoShape">
+              <a:avLst/>
+            </a:prstTxWarp>
+            <a:noAutofit/>
+          </a:bodyPr>
+          <a:lstStyle/>
+          <a:p>
+            <a:pPr algn="ctr"/>
+            <a:endParaRPr lang="en-US"/>
+          </a:p>
+        </p:txBody>
+      </p:sp>
+      <p:sp>
+        <p:nvSpPr>
+          <p:cNvPr id="54" name="Rectangle 53">
+            <a:extLst>
+              <a:ext uri="{FF2B5EF4-FFF2-40B4-BE49-F238E27FC236}">
+                <a16:creationId xmlns:a16="http://schemas.microsoft.com/office/drawing/2014/main" id="{966EE5B7-B8CE-4946-9509-6243AA2EF3B5}"/>
+              </a:ext>
+            </a:extLst>
+          </p:cNvPr>
+          <p:cNvSpPr/>
+          <p:nvPr/>
+        </p:nvSpPr>
+        <p:spPr>
+          <a:xfrm>
+            <a:off x="808756" y="630807"/>
+            <a:ext cx="178816" cy="178816"/>
+          </a:xfrm>
+          <a:prstGeom prst="rect">
+            <a:avLst/>
+          </a:prstGeom>
+          <a:solidFill>
+            <a:schemeClr val="accent1">
+              <a:lumMod val="20000"/>
+              <a:lumOff val="80000"/>
+            </a:schemeClr>
+          </a:solidFill>
+          <a:ln w="25400">
+            <a:solidFill>
+              <a:schemeClr val="tx1"/>
+            </a:solidFill>
+          </a:ln>
+        </p:spPr>
+        <p:style>
+          <a:lnRef idx="2">
+            <a:schemeClr val="accent1">
+              <a:shade val="50000"/>
+            </a:schemeClr>
+          </a:lnRef>
+          <a:fillRef idx="1">
+            <a:schemeClr val="accent1"/>
+          </a:fillRef>
+          <a:effectRef idx="0">
+            <a:schemeClr val="accent1"/>
+          </a:effectRef>
+          <a:fontRef idx="minor">
+            <a:schemeClr val="lt1"/>
+          </a:fontRef>
+        </p:style>
+        <p:txBody>
+          <a:bodyPr rot="0" spcFirstLastPara="0" vertOverflow="overflow" horzOverflow="overflow" vert="horz" wrap="square" lIns="91440" tIns="45720" rIns="91440" bIns="45720" numCol="1" spcCol="0" rtlCol="0" fromWordArt="0" anchor="ctr" anchorCtr="0" forceAA="0" compatLnSpc="1">
+            <a:prstTxWarp prst="textNoShape">
+              <a:avLst/>
+            </a:prstTxWarp>
+            <a:noAutofit/>
+          </a:bodyPr>
+          <a:lstStyle/>
+          <a:p>
+            <a:pPr algn="ctr"/>
+            <a:endParaRPr lang="en-US"/>
+          </a:p>
+        </p:txBody>
+      </p:sp>
+      <p:sp>
+        <p:nvSpPr>
+          <p:cNvPr id="61" name="Rectangle 60">
+            <a:extLst>
+              <a:ext uri="{FF2B5EF4-FFF2-40B4-BE49-F238E27FC236}">
+                <a16:creationId xmlns:a16="http://schemas.microsoft.com/office/drawing/2014/main" id="{964B5ACC-4DFF-2B47-AA22-94F203E19A34}"/>
+              </a:ext>
+            </a:extLst>
+          </p:cNvPr>
+          <p:cNvSpPr/>
+          <p:nvPr/>
+        </p:nvSpPr>
+        <p:spPr>
+          <a:xfrm>
+            <a:off x="1330966" y="626230"/>
+            <a:ext cx="178816" cy="178816"/>
+          </a:xfrm>
+          <a:prstGeom prst="rect">
+            <a:avLst/>
+          </a:prstGeom>
+          <a:solidFill>
+            <a:schemeClr val="accent1">
+              <a:lumMod val="20000"/>
+              <a:lumOff val="80000"/>
+            </a:schemeClr>
+          </a:solidFill>
+          <a:ln w="25400">
+            <a:solidFill>
+              <a:schemeClr val="tx1"/>
+            </a:solidFill>
+          </a:ln>
+        </p:spPr>
+        <p:style>
+          <a:lnRef idx="2">
+            <a:schemeClr val="accent1">
+              <a:shade val="50000"/>
+            </a:schemeClr>
+          </a:lnRef>
+          <a:fillRef idx="1">
+            <a:schemeClr val="accent1"/>
+          </a:fillRef>
+          <a:effectRef idx="0">
+            <a:schemeClr val="accent1"/>
+          </a:effectRef>
+          <a:fontRef idx="minor">
+            <a:schemeClr val="lt1"/>
+          </a:fontRef>
+        </p:style>
+        <p:txBody>
+          <a:bodyPr rot="0" spcFirstLastPara="0" vertOverflow="overflow" horzOverflow="overflow" vert="horz" wrap="square" lIns="91440" tIns="45720" rIns="91440" bIns="45720" numCol="1" spcCol="0" rtlCol="0" fromWordArt="0" anchor="ctr" anchorCtr="0" forceAA="0" compatLnSpc="1">
+            <a:prstTxWarp prst="textNoShape">
+              <a:avLst/>
+            </a:prstTxWarp>
+            <a:noAutofit/>
+          </a:bodyPr>
+          <a:lstStyle/>
+          <a:p>
+            <a:pPr algn="ctr"/>
+            <a:endParaRPr lang="en-US"/>
+          </a:p>
+        </p:txBody>
+      </p:sp>
+      <p:sp>
+        <p:nvSpPr>
+          <p:cNvPr id="62" name="Rectangle 61">
+            <a:extLst>
+              <a:ext uri="{FF2B5EF4-FFF2-40B4-BE49-F238E27FC236}">
+                <a16:creationId xmlns:a16="http://schemas.microsoft.com/office/drawing/2014/main" id="{D92D78BB-D335-F348-8DB3-4852F24C7B39}"/>
+              </a:ext>
+            </a:extLst>
+          </p:cNvPr>
+          <p:cNvSpPr/>
+          <p:nvPr/>
+        </p:nvSpPr>
+        <p:spPr>
+          <a:xfrm>
+            <a:off x="1853176" y="625948"/>
+            <a:ext cx="178816" cy="178816"/>
+          </a:xfrm>
+          <a:prstGeom prst="rect">
+            <a:avLst/>
+          </a:prstGeom>
+          <a:solidFill>
+            <a:schemeClr val="accent1">
+              <a:lumMod val="20000"/>
+              <a:lumOff val="80000"/>
+            </a:schemeClr>
+          </a:solidFill>
+          <a:ln w="25400">
+            <a:solidFill>
+              <a:schemeClr val="tx1"/>
+            </a:solidFill>
+          </a:ln>
+        </p:spPr>
+        <p:style>
+          <a:lnRef idx="2">
+            <a:schemeClr val="accent1">
+              <a:shade val="50000"/>
+            </a:schemeClr>
+          </a:lnRef>
+          <a:fillRef idx="1">
+            <a:schemeClr val="accent1"/>
+          </a:fillRef>
+          <a:effectRef idx="0">
+            <a:schemeClr val="accent1"/>
+          </a:effectRef>
+          <a:fontRef idx="minor">
+            <a:schemeClr val="lt1"/>
+          </a:fontRef>
+        </p:style>
+        <p:txBody>
+          <a:bodyPr rot="0" spcFirstLastPara="0" vertOverflow="overflow" horzOverflow="overflow" vert="horz" wrap="square" lIns="91440" tIns="45720" rIns="91440" bIns="45720" numCol="1" spcCol="0" rtlCol="0" fromWordArt="0" anchor="ctr" anchorCtr="0" forceAA="0" compatLnSpc="1">
+            <a:prstTxWarp prst="textNoShape">
+              <a:avLst/>
+            </a:prstTxWarp>
+            <a:noAutofit/>
+          </a:bodyPr>
+          <a:lstStyle/>
+          <a:p>
+            <a:pPr algn="ctr"/>
+            <a:endParaRPr lang="en-US"/>
+          </a:p>
+        </p:txBody>
+      </p:sp>
+      <p:sp>
+        <p:nvSpPr>
+          <p:cNvPr id="63" name="Rectangle 62">
+            <a:extLst>
+              <a:ext uri="{FF2B5EF4-FFF2-40B4-BE49-F238E27FC236}">
+                <a16:creationId xmlns:a16="http://schemas.microsoft.com/office/drawing/2014/main" id="{A97952DB-6E35-EC47-A829-48C18AE55B1E}"/>
+              </a:ext>
+            </a:extLst>
+          </p:cNvPr>
+          <p:cNvSpPr/>
+          <p:nvPr/>
+        </p:nvSpPr>
+        <p:spPr>
+          <a:xfrm>
+            <a:off x="2363738" y="625948"/>
+            <a:ext cx="178816" cy="178816"/>
+          </a:xfrm>
+          <a:prstGeom prst="rect">
+            <a:avLst/>
+          </a:prstGeom>
+          <a:solidFill>
+            <a:schemeClr val="accent1">
+              <a:lumMod val="20000"/>
+              <a:lumOff val="80000"/>
+            </a:schemeClr>
+          </a:solidFill>
+          <a:ln w="25400">
+            <a:solidFill>
+              <a:schemeClr val="tx1"/>
+            </a:solidFill>
+          </a:ln>
+        </p:spPr>
+        <p:style>
+          <a:lnRef idx="2">
+            <a:schemeClr val="accent1">
+              <a:shade val="50000"/>
+            </a:schemeClr>
+          </a:lnRef>
+          <a:fillRef idx="1">
+            <a:schemeClr val="accent1"/>
+          </a:fillRef>
+          <a:effectRef idx="0">
+            <a:schemeClr val="accent1"/>
+          </a:effectRef>
+          <a:fontRef idx="minor">
+            <a:schemeClr val="lt1"/>
+          </a:fontRef>
+        </p:style>
+        <p:txBody>
+          <a:bodyPr rot="0" spcFirstLastPara="0" vertOverflow="overflow" horzOverflow="overflow" vert="horz" wrap="square" lIns="91440" tIns="45720" rIns="91440" bIns="45720" numCol="1" spcCol="0" rtlCol="0" fromWordArt="0" anchor="ctr" anchorCtr="0" forceAA="0" compatLnSpc="1">
+            <a:prstTxWarp prst="textNoShape">
+              <a:avLst/>
+            </a:prstTxWarp>
+            <a:noAutofit/>
+          </a:bodyPr>
+          <a:lstStyle/>
+          <a:p>
+            <a:pPr algn="ctr"/>
+            <a:endParaRPr lang="en-US"/>
+          </a:p>
+        </p:txBody>
+      </p:sp>
+      <p:cxnSp>
+        <p:nvCxnSpPr>
+          <p:cNvPr id="64" name="Straight Arrow Connector 63">
+            <a:extLst>
+              <a:ext uri="{FF2B5EF4-FFF2-40B4-BE49-F238E27FC236}">
+                <a16:creationId xmlns:a16="http://schemas.microsoft.com/office/drawing/2014/main" id="{CF87CD5E-25C1-8647-A2B9-004A48DC5355}"/>
+              </a:ext>
+            </a:extLst>
+          </p:cNvPr>
+          <p:cNvCxnSpPr>
+            <a:cxnSpLocks/>
+          </p:cNvCxnSpPr>
+          <p:nvPr/>
+        </p:nvCxnSpPr>
+        <p:spPr>
+          <a:xfrm>
+            <a:off x="547129" y="711293"/>
+            <a:ext cx="189571" cy="0"/>
+          </a:xfrm>
+          <a:prstGeom prst="straightConnector1">
+            <a:avLst/>
+          </a:prstGeom>
+          <a:ln w="25400">
+            <a:solidFill>
+              <a:schemeClr val="tx1"/>
+            </a:solidFill>
+            <a:tailEnd type="triangle" w="med" len="med"/>
+          </a:ln>
+        </p:spPr>
+        <p:style>
+          <a:lnRef idx="1">
+            <a:schemeClr val="accent1"/>
+          </a:lnRef>
+          <a:fillRef idx="0">
+            <a:schemeClr val="accent1"/>
+          </a:fillRef>
+          <a:effectRef idx="0">
+            <a:schemeClr val="accent1"/>
+          </a:effectRef>
+          <a:fontRef idx="minor">
+            <a:schemeClr val="tx1"/>
+          </a:fontRef>
+        </p:style>
+      </p:cxnSp>
+      <p:cxnSp>
+        <p:nvCxnSpPr>
+          <p:cNvPr id="65" name="Straight Arrow Connector 64">
+            <a:extLst>
+              <a:ext uri="{FF2B5EF4-FFF2-40B4-BE49-F238E27FC236}">
+                <a16:creationId xmlns:a16="http://schemas.microsoft.com/office/drawing/2014/main" id="{E6BBA3C2-BE52-B44B-849A-7CCDF07EB67A}"/>
+              </a:ext>
+            </a:extLst>
+          </p:cNvPr>
+          <p:cNvCxnSpPr>
+            <a:cxnSpLocks/>
+          </p:cNvCxnSpPr>
+          <p:nvPr/>
+        </p:nvCxnSpPr>
+        <p:spPr>
+          <a:xfrm>
+            <a:off x="1061225" y="716082"/>
+            <a:ext cx="189571" cy="0"/>
+          </a:xfrm>
+          <a:prstGeom prst="straightConnector1">
+            <a:avLst/>
+          </a:prstGeom>
+          <a:ln w="25400">
+            <a:solidFill>
+              <a:schemeClr val="tx1"/>
+            </a:solidFill>
+            <a:tailEnd type="triangle" w="med" len="med"/>
+          </a:ln>
+        </p:spPr>
+        <p:style>
+          <a:lnRef idx="1">
+            <a:schemeClr val="accent1"/>
+          </a:lnRef>
+          <a:fillRef idx="0">
+            <a:schemeClr val="accent1"/>
+          </a:fillRef>
+          <a:effectRef idx="0">
+            <a:schemeClr val="accent1"/>
+          </a:effectRef>
+          <a:fontRef idx="minor">
+            <a:schemeClr val="tx1"/>
+          </a:fontRef>
+        </p:style>
+      </p:cxnSp>
+      <p:cxnSp>
+        <p:nvCxnSpPr>
+          <p:cNvPr id="66" name="Straight Arrow Connector 65">
+            <a:extLst>
+              <a:ext uri="{FF2B5EF4-FFF2-40B4-BE49-F238E27FC236}">
+                <a16:creationId xmlns:a16="http://schemas.microsoft.com/office/drawing/2014/main" id="{61449271-F4A4-054C-BDCF-3FADE5B0F31E}"/>
+              </a:ext>
+            </a:extLst>
+          </p:cNvPr>
+          <p:cNvCxnSpPr>
+            <a:cxnSpLocks/>
+          </p:cNvCxnSpPr>
+          <p:nvPr/>
+        </p:nvCxnSpPr>
+        <p:spPr>
+          <a:xfrm>
+            <a:off x="1585481" y="716807"/>
+            <a:ext cx="189571" cy="0"/>
+          </a:xfrm>
+          <a:prstGeom prst="straightConnector1">
+            <a:avLst/>
+          </a:prstGeom>
+          <a:ln w="25400">
+            <a:solidFill>
+              <a:schemeClr val="tx1"/>
+            </a:solidFill>
+            <a:tailEnd type="triangle" w="med" len="med"/>
+          </a:ln>
+        </p:spPr>
+        <p:style>
+          <a:lnRef idx="1">
+            <a:schemeClr val="accent1"/>
+          </a:lnRef>
+          <a:fillRef idx="0">
+            <a:schemeClr val="accent1"/>
+          </a:fillRef>
+          <a:effectRef idx="0">
+            <a:schemeClr val="accent1"/>
+          </a:effectRef>
+          <a:fontRef idx="minor">
+            <a:schemeClr val="tx1"/>
+          </a:fontRef>
+        </p:style>
+      </p:cxnSp>
+      <p:cxnSp>
+        <p:nvCxnSpPr>
+          <p:cNvPr id="67" name="Straight Arrow Connector 66">
+            <a:extLst>
+              <a:ext uri="{FF2B5EF4-FFF2-40B4-BE49-F238E27FC236}">
+                <a16:creationId xmlns:a16="http://schemas.microsoft.com/office/drawing/2014/main" id="{92C98AB2-A335-064E-B9BA-E540E7053D14}"/>
+              </a:ext>
+            </a:extLst>
+          </p:cNvPr>
+          <p:cNvCxnSpPr>
+            <a:cxnSpLocks/>
+          </p:cNvCxnSpPr>
+          <p:nvPr/>
+        </p:nvCxnSpPr>
+        <p:spPr>
+          <a:xfrm>
+            <a:off x="2118510" y="716082"/>
+            <a:ext cx="189571" cy="0"/>
+          </a:xfrm>
+          <a:prstGeom prst="straightConnector1">
+            <a:avLst/>
+          </a:prstGeom>
+          <a:ln w="25400">
+            <a:solidFill>
+              <a:schemeClr val="tx1"/>
+            </a:solidFill>
+            <a:tailEnd type="triangle" w="med" len="med"/>
+          </a:ln>
+        </p:spPr>
+        <p:style>
+          <a:lnRef idx="1">
+            <a:schemeClr val="accent1"/>
+          </a:lnRef>
+          <a:fillRef idx="0">
+            <a:schemeClr val="accent1"/>
+          </a:fillRef>
+          <a:effectRef idx="0">
+            <a:schemeClr val="accent1"/>
+          </a:effectRef>
+          <a:fontRef idx="minor">
+            <a:schemeClr val="tx1"/>
+          </a:fontRef>
+        </p:style>
+      </p:cxnSp>
+      <p:cxnSp>
+        <p:nvCxnSpPr>
+          <p:cNvPr id="68" name="Straight Arrow Connector 67">
+            <a:extLst>
+              <a:ext uri="{FF2B5EF4-FFF2-40B4-BE49-F238E27FC236}">
+                <a16:creationId xmlns:a16="http://schemas.microsoft.com/office/drawing/2014/main" id="{54A5783E-9395-D64B-925A-188790B2AAB6}"/>
+              </a:ext>
+            </a:extLst>
+          </p:cNvPr>
+          <p:cNvCxnSpPr>
+            <a:cxnSpLocks/>
+          </p:cNvCxnSpPr>
+          <p:nvPr/>
+        </p:nvCxnSpPr>
+        <p:spPr>
+          <a:xfrm flipV="1">
+            <a:off x="370335" y="833897"/>
+            <a:ext cx="0" cy="147611"/>
+          </a:xfrm>
+          <a:prstGeom prst="straightConnector1">
+            <a:avLst/>
+          </a:prstGeom>
+          <a:ln w="25400">
+            <a:solidFill>
+              <a:schemeClr val="tx1"/>
+            </a:solidFill>
+            <a:tailEnd type="triangle" w="med" len="med"/>
+          </a:ln>
+        </p:spPr>
+        <p:style>
+          <a:lnRef idx="1">
+            <a:schemeClr val="accent1"/>
+          </a:lnRef>
+          <a:fillRef idx="0">
+            <a:schemeClr val="accent1"/>
+          </a:fillRef>
+          <a:effectRef idx="0">
+            <a:schemeClr val="accent1"/>
+          </a:effectRef>
+          <a:fontRef idx="minor">
+            <a:schemeClr val="tx1"/>
+          </a:fontRef>
+        </p:style>
+      </p:cxnSp>
+      <p:cxnSp>
+        <p:nvCxnSpPr>
+          <p:cNvPr id="69" name="Straight Arrow Connector 68">
+            <a:extLst>
+              <a:ext uri="{FF2B5EF4-FFF2-40B4-BE49-F238E27FC236}">
+                <a16:creationId xmlns:a16="http://schemas.microsoft.com/office/drawing/2014/main" id="{91C950DA-7F5C-E34B-A741-66A3B34A0A8D}"/>
+              </a:ext>
+            </a:extLst>
+          </p:cNvPr>
+          <p:cNvCxnSpPr>
+            <a:cxnSpLocks/>
+          </p:cNvCxnSpPr>
+          <p:nvPr/>
+        </p:nvCxnSpPr>
+        <p:spPr>
+          <a:xfrm flipV="1">
+            <a:off x="896623" y="833897"/>
+            <a:ext cx="0" cy="147611"/>
+          </a:xfrm>
+          <a:prstGeom prst="straightConnector1">
+            <a:avLst/>
+          </a:prstGeom>
+          <a:ln w="25400">
+            <a:solidFill>
+              <a:schemeClr val="tx1"/>
+            </a:solidFill>
+            <a:tailEnd type="triangle" w="med" len="med"/>
+          </a:ln>
+        </p:spPr>
+        <p:style>
+          <a:lnRef idx="1">
+            <a:schemeClr val="accent1"/>
+          </a:lnRef>
+          <a:fillRef idx="0">
+            <a:schemeClr val="accent1"/>
+          </a:fillRef>
+          <a:effectRef idx="0">
+            <a:schemeClr val="accent1"/>
+          </a:effectRef>
+          <a:fontRef idx="minor">
+            <a:schemeClr val="tx1"/>
+          </a:fontRef>
+        </p:style>
+      </p:cxnSp>
+      <p:cxnSp>
+        <p:nvCxnSpPr>
+          <p:cNvPr id="70" name="Straight Arrow Connector 69">
+            <a:extLst>
+              <a:ext uri="{FF2B5EF4-FFF2-40B4-BE49-F238E27FC236}">
+                <a16:creationId xmlns:a16="http://schemas.microsoft.com/office/drawing/2014/main" id="{6DDDAE29-7DCB-814B-BA69-6D6E19270346}"/>
+              </a:ext>
+            </a:extLst>
+          </p:cNvPr>
+          <p:cNvCxnSpPr>
+            <a:cxnSpLocks/>
+          </p:cNvCxnSpPr>
+          <p:nvPr/>
+        </p:nvCxnSpPr>
+        <p:spPr>
+          <a:xfrm flipV="1">
+            <a:off x="1412751" y="833897"/>
+            <a:ext cx="0" cy="147611"/>
+          </a:xfrm>
+          <a:prstGeom prst="straightConnector1">
+            <a:avLst/>
+          </a:prstGeom>
+          <a:ln w="25400">
+            <a:solidFill>
+              <a:schemeClr val="tx1"/>
+            </a:solidFill>
+            <a:tailEnd type="triangle" w="med" len="med"/>
+          </a:ln>
+        </p:spPr>
+        <p:style>
+          <a:lnRef idx="1">
+            <a:schemeClr val="accent1"/>
+          </a:lnRef>
+          <a:fillRef idx="0">
+            <a:schemeClr val="accent1"/>
+          </a:fillRef>
+          <a:effectRef idx="0">
+            <a:schemeClr val="accent1"/>
+          </a:effectRef>
+          <a:fontRef idx="minor">
+            <a:schemeClr val="tx1"/>
+          </a:fontRef>
+        </p:style>
+      </p:cxnSp>
+      <p:cxnSp>
+        <p:nvCxnSpPr>
+          <p:cNvPr id="71" name="Straight Arrow Connector 70">
+            <a:extLst>
+              <a:ext uri="{FF2B5EF4-FFF2-40B4-BE49-F238E27FC236}">
+                <a16:creationId xmlns:a16="http://schemas.microsoft.com/office/drawing/2014/main" id="{CD68BFE1-5F55-5C46-8043-CC8EB9016A07}"/>
+              </a:ext>
+            </a:extLst>
+          </p:cNvPr>
+          <p:cNvCxnSpPr>
+            <a:cxnSpLocks/>
+          </p:cNvCxnSpPr>
+          <p:nvPr/>
+        </p:nvCxnSpPr>
+        <p:spPr>
+          <a:xfrm flipV="1">
+            <a:off x="1932943" y="833897"/>
+            <a:ext cx="0" cy="147611"/>
+          </a:xfrm>
+          <a:prstGeom prst="straightConnector1">
+            <a:avLst/>
+          </a:prstGeom>
+          <a:ln w="25400">
+            <a:solidFill>
+              <a:schemeClr val="tx1"/>
+            </a:solidFill>
+            <a:tailEnd type="triangle" w="med" len="med"/>
+          </a:ln>
+        </p:spPr>
+        <p:style>
+          <a:lnRef idx="1">
+            <a:schemeClr val="accent1"/>
+          </a:lnRef>
+          <a:fillRef idx="0">
+            <a:schemeClr val="accent1"/>
+          </a:fillRef>
+          <a:effectRef idx="0">
+            <a:schemeClr val="accent1"/>
+          </a:effectRef>
+          <a:fontRef idx="minor">
+            <a:schemeClr val="tx1"/>
+          </a:fontRef>
+        </p:style>
+      </p:cxnSp>
+      <p:cxnSp>
+        <p:nvCxnSpPr>
+          <p:cNvPr id="72" name="Straight Arrow Connector 71">
+            <a:extLst>
+              <a:ext uri="{FF2B5EF4-FFF2-40B4-BE49-F238E27FC236}">
+                <a16:creationId xmlns:a16="http://schemas.microsoft.com/office/drawing/2014/main" id="{CA03AEAE-B9AB-9E44-A044-0B159ECF6AF0}"/>
+              </a:ext>
+            </a:extLst>
+          </p:cNvPr>
+          <p:cNvCxnSpPr>
+            <a:cxnSpLocks/>
+          </p:cNvCxnSpPr>
+          <p:nvPr/>
+        </p:nvCxnSpPr>
+        <p:spPr>
+          <a:xfrm flipV="1">
+            <a:off x="2447781" y="833897"/>
+            <a:ext cx="0" cy="147611"/>
+          </a:xfrm>
+          <a:prstGeom prst="straightConnector1">
+            <a:avLst/>
+          </a:prstGeom>
+          <a:ln w="25400">
+            <a:solidFill>
+              <a:schemeClr val="tx1"/>
+            </a:solidFill>
+            <a:tailEnd type="triangle" w="med" len="med"/>
+          </a:ln>
+        </p:spPr>
+        <p:style>
+          <a:lnRef idx="1">
+            <a:schemeClr val="accent1"/>
+          </a:lnRef>
+          <a:fillRef idx="0">
+            <a:schemeClr val="accent1"/>
+          </a:fillRef>
+          <a:effectRef idx="0">
+            <a:schemeClr val="accent1"/>
+          </a:effectRef>
+          <a:fontRef idx="minor">
+            <a:schemeClr val="tx1"/>
+          </a:fontRef>
+        </p:style>
+      </p:cxnSp>
     </p:spTree>
     <p:extLst>
       <p:ext uri="{BB962C8B-B14F-4D97-AF65-F5344CB8AC3E}">
@@ -5244,7 +5635,7 @@
                                           </p:stCondLst>
                                         </p:cTn>
                                         <p:tgtEl>
-                                          <p:spTgt spid="30"/>
+                                          <p:spTgt spid="43"/>
                                         </p:tgtEl>
                                         <p:attrNameLst>
                                           <p:attrName>style.visibility</p:attrName>
@@ -5271,7 +5662,7 @@
                                           </p:stCondLst>
                                         </p:cTn>
                                         <p:tgtEl>
-                                          <p:spTgt spid="31"/>
+                                          <p:spTgt spid="47"/>
                                         </p:tgtEl>
                                         <p:attrNameLst>
                                           <p:attrName>style.visibility</p:attrName>
@@ -5298,7 +5689,7 @@
                                           </p:stCondLst>
                                         </p:cTn>
                                         <p:tgtEl>
-                                          <p:spTgt spid="32"/>
+                                          <p:spTgt spid="59"/>
                                         </p:tgtEl>
                                         <p:attrNameLst>
                                           <p:attrName>style.visibility</p:attrName>
@@ -5325,7 +5716,7 @@
                                           </p:stCondLst>
                                         </p:cTn>
                                         <p:tgtEl>
-                                          <p:spTgt spid="33"/>
+                                          <p:spTgt spid="35"/>
                                         </p:tgtEl>
                                         <p:attrNameLst>
                                           <p:attrName>style.visibility</p:attrName>
@@ -5352,7 +5743,7 @@
                                           </p:stCondLst>
                                         </p:cTn>
                                         <p:tgtEl>
-                                          <p:spTgt spid="34"/>
+                                          <p:spTgt spid="46"/>
                                         </p:tgtEl>
                                         <p:attrNameLst>
                                           <p:attrName>style.visibility</p:attrName>
@@ -5379,7 +5770,7 @@
                                           </p:stCondLst>
                                         </p:cTn>
                                         <p:tgtEl>
-                                          <p:spTgt spid="43"/>
+                                          <p:spTgt spid="49"/>
                                         </p:tgtEl>
                                         <p:attrNameLst>
                                           <p:attrName>style.visibility</p:attrName>
@@ -5406,7 +5797,7 @@
                                           </p:stCondLst>
                                         </p:cTn>
                                         <p:tgtEl>
-                                          <p:spTgt spid="47"/>
+                                          <p:spTgt spid="50"/>
                                         </p:tgtEl>
                                         <p:attrNameLst>
                                           <p:attrName>style.visibility</p:attrName>
@@ -5433,7 +5824,7 @@
                                           </p:stCondLst>
                                         </p:cTn>
                                         <p:tgtEl>
-                                          <p:spTgt spid="59"/>
+                                          <p:spTgt spid="51"/>
                                         </p:tgtEl>
                                         <p:attrNameLst>
                                           <p:attrName>style.visibility</p:attrName>

</xml_diff>